<commit_message>
17 February 2019 Tense Article
</commit_message>
<xml_diff>
--- a/Saturday_Monday_Wednesday/Class_6_16_February_2019/Parts_of_Speech.pptx
+++ b/Saturday_Monday_Wednesday/Class_6_16_February_2019/Parts_of_Speech.pptx
@@ -302,7 +302,7 @@
           <a:bodyPr lIns="0" rIns="0" tIns="0" bIns="0" anchor="b"/>
           <a:p>
             <a:pPr algn="r"/>
-            <a:fld id="{9A50BD53-60D6-41F6-B50E-AB3135EC6C6F}" type="slidenum">
+            <a:fld id="{C6694DD6-CF1F-4895-8874-F7C9EDC1290E}" type="slidenum">
               <a:rPr b="0" lang="en-US" sz="1400" spc="-1" strike="noStrike">
                 <a:solidFill>
                   <a:srgbClr val="000000"/>
@@ -355,14 +355,14 @@
       </p:grpSpPr>
       <p:sp>
         <p:nvSpPr>
-          <p:cNvPr id="207" name="CustomShape 1"/>
+          <p:cNvPr id="208" name="CustomShape 1"/>
           <p:cNvSpPr/>
           <p:nvPr/>
         </p:nvSpPr>
         <p:spPr>
           <a:xfrm>
             <a:off x="755640" y="5078520"/>
-            <a:ext cx="6046920" cy="4810320"/>
+            <a:ext cx="6046560" cy="4809960"/>
           </a:xfrm>
           <a:custGeom>
             <a:avLst/>
@@ -426,14 +426,14 @@
       </p:grpSpPr>
       <p:sp>
         <p:nvSpPr>
-          <p:cNvPr id="216" name="CustomShape 1"/>
+          <p:cNvPr id="217" name="CustomShape 1"/>
           <p:cNvSpPr/>
           <p:nvPr/>
         </p:nvSpPr>
         <p:spPr>
           <a:xfrm>
             <a:off x="755640" y="5078520"/>
-            <a:ext cx="6046920" cy="4810320"/>
+            <a:ext cx="6046560" cy="4809960"/>
           </a:xfrm>
           <a:custGeom>
             <a:avLst/>
@@ -497,14 +497,14 @@
       </p:grpSpPr>
       <p:sp>
         <p:nvSpPr>
-          <p:cNvPr id="217" name="CustomShape 1"/>
+          <p:cNvPr id="218" name="CustomShape 1"/>
           <p:cNvSpPr/>
           <p:nvPr/>
         </p:nvSpPr>
         <p:spPr>
           <a:xfrm>
             <a:off x="755640" y="5078520"/>
-            <a:ext cx="6046920" cy="4810320"/>
+            <a:ext cx="6046560" cy="4809960"/>
           </a:xfrm>
           <a:custGeom>
             <a:avLst/>
@@ -568,14 +568,14 @@
       </p:grpSpPr>
       <p:sp>
         <p:nvSpPr>
-          <p:cNvPr id="218" name="CustomShape 1"/>
+          <p:cNvPr id="219" name="CustomShape 1"/>
           <p:cNvSpPr/>
           <p:nvPr/>
         </p:nvSpPr>
         <p:spPr>
           <a:xfrm>
             <a:off x="755640" y="5078520"/>
-            <a:ext cx="6046920" cy="4810320"/>
+            <a:ext cx="6046560" cy="4809960"/>
           </a:xfrm>
           <a:custGeom>
             <a:avLst/>
@@ -639,14 +639,14 @@
       </p:grpSpPr>
       <p:sp>
         <p:nvSpPr>
-          <p:cNvPr id="219" name="CustomShape 1"/>
+          <p:cNvPr id="220" name="CustomShape 1"/>
           <p:cNvSpPr/>
           <p:nvPr/>
         </p:nvSpPr>
         <p:spPr>
           <a:xfrm>
             <a:off x="755640" y="5078520"/>
-            <a:ext cx="6046920" cy="4810320"/>
+            <a:ext cx="6046560" cy="4809960"/>
           </a:xfrm>
           <a:custGeom>
             <a:avLst/>
@@ -710,14 +710,14 @@
       </p:grpSpPr>
       <p:sp>
         <p:nvSpPr>
-          <p:cNvPr id="220" name="CustomShape 1"/>
+          <p:cNvPr id="221" name="CustomShape 1"/>
           <p:cNvSpPr/>
           <p:nvPr/>
         </p:nvSpPr>
         <p:spPr>
           <a:xfrm>
             <a:off x="755640" y="5078520"/>
-            <a:ext cx="6046920" cy="4810320"/>
+            <a:ext cx="6046560" cy="4809960"/>
           </a:xfrm>
           <a:custGeom>
             <a:avLst/>
@@ -781,14 +781,14 @@
       </p:grpSpPr>
       <p:sp>
         <p:nvSpPr>
-          <p:cNvPr id="221" name="CustomShape 1"/>
+          <p:cNvPr id="222" name="CustomShape 1"/>
           <p:cNvSpPr/>
           <p:nvPr/>
         </p:nvSpPr>
         <p:spPr>
           <a:xfrm>
             <a:off x="755640" y="5078520"/>
-            <a:ext cx="6046920" cy="4810320"/>
+            <a:ext cx="6046560" cy="4809960"/>
           </a:xfrm>
           <a:custGeom>
             <a:avLst/>
@@ -852,14 +852,14 @@
       </p:grpSpPr>
       <p:sp>
         <p:nvSpPr>
-          <p:cNvPr id="222" name="CustomShape 1"/>
+          <p:cNvPr id="223" name="CustomShape 1"/>
           <p:cNvSpPr/>
           <p:nvPr/>
         </p:nvSpPr>
         <p:spPr>
           <a:xfrm>
             <a:off x="755640" y="5078520"/>
-            <a:ext cx="6046920" cy="4810320"/>
+            <a:ext cx="6046560" cy="4809960"/>
           </a:xfrm>
           <a:custGeom>
             <a:avLst/>
@@ -923,14 +923,14 @@
       </p:grpSpPr>
       <p:sp>
         <p:nvSpPr>
-          <p:cNvPr id="223" name="CustomShape 1"/>
+          <p:cNvPr id="224" name="CustomShape 1"/>
           <p:cNvSpPr/>
           <p:nvPr/>
         </p:nvSpPr>
         <p:spPr>
           <a:xfrm>
             <a:off x="755640" y="5078520"/>
-            <a:ext cx="6046920" cy="4810320"/>
+            <a:ext cx="6046560" cy="4809960"/>
           </a:xfrm>
           <a:custGeom>
             <a:avLst/>
@@ -994,14 +994,14 @@
       </p:grpSpPr>
       <p:sp>
         <p:nvSpPr>
-          <p:cNvPr id="224" name="CustomShape 1"/>
+          <p:cNvPr id="225" name="CustomShape 1"/>
           <p:cNvSpPr/>
           <p:nvPr/>
         </p:nvSpPr>
         <p:spPr>
           <a:xfrm>
             <a:off x="755640" y="5078520"/>
-            <a:ext cx="6046920" cy="4810320"/>
+            <a:ext cx="6046560" cy="4809960"/>
           </a:xfrm>
           <a:custGeom>
             <a:avLst/>
@@ -1065,14 +1065,14 @@
       </p:grpSpPr>
       <p:sp>
         <p:nvSpPr>
-          <p:cNvPr id="225" name="CustomShape 1"/>
+          <p:cNvPr id="226" name="CustomShape 1"/>
           <p:cNvSpPr/>
           <p:nvPr/>
         </p:nvSpPr>
         <p:spPr>
           <a:xfrm>
             <a:off x="755640" y="5078520"/>
-            <a:ext cx="6046920" cy="4810320"/>
+            <a:ext cx="6046560" cy="4809960"/>
           </a:xfrm>
           <a:custGeom>
             <a:avLst/>
@@ -1136,14 +1136,14 @@
       </p:grpSpPr>
       <p:sp>
         <p:nvSpPr>
-          <p:cNvPr id="208" name="CustomShape 1"/>
+          <p:cNvPr id="209" name="CustomShape 1"/>
           <p:cNvSpPr/>
           <p:nvPr/>
         </p:nvSpPr>
         <p:spPr>
           <a:xfrm>
             <a:off x="755640" y="5078520"/>
-            <a:ext cx="6046920" cy="4810320"/>
+            <a:ext cx="6046560" cy="4809960"/>
           </a:xfrm>
           <a:custGeom>
             <a:avLst/>
@@ -1207,14 +1207,14 @@
       </p:grpSpPr>
       <p:sp>
         <p:nvSpPr>
-          <p:cNvPr id="226" name="CustomShape 1"/>
+          <p:cNvPr id="227" name="CustomShape 1"/>
           <p:cNvSpPr/>
           <p:nvPr/>
         </p:nvSpPr>
         <p:spPr>
           <a:xfrm>
             <a:off x="755640" y="5078520"/>
-            <a:ext cx="6046920" cy="4810320"/>
+            <a:ext cx="6046560" cy="4809960"/>
           </a:xfrm>
           <a:custGeom>
             <a:avLst/>
@@ -1278,14 +1278,14 @@
       </p:grpSpPr>
       <p:sp>
         <p:nvSpPr>
-          <p:cNvPr id="227" name="CustomShape 1"/>
+          <p:cNvPr id="228" name="CustomShape 1"/>
           <p:cNvSpPr/>
           <p:nvPr/>
         </p:nvSpPr>
         <p:spPr>
           <a:xfrm>
             <a:off x="755640" y="5078520"/>
-            <a:ext cx="6046920" cy="4810320"/>
+            <a:ext cx="6046560" cy="4809960"/>
           </a:xfrm>
           <a:custGeom>
             <a:avLst/>
@@ -1349,14 +1349,14 @@
       </p:grpSpPr>
       <p:sp>
         <p:nvSpPr>
-          <p:cNvPr id="228" name="CustomShape 1"/>
+          <p:cNvPr id="229" name="CustomShape 1"/>
           <p:cNvSpPr/>
           <p:nvPr/>
         </p:nvSpPr>
         <p:spPr>
           <a:xfrm>
             <a:off x="755640" y="5078520"/>
-            <a:ext cx="6046920" cy="4810320"/>
+            <a:ext cx="6046560" cy="4809960"/>
           </a:xfrm>
           <a:custGeom>
             <a:avLst/>
@@ -1420,14 +1420,14 @@
       </p:grpSpPr>
       <p:sp>
         <p:nvSpPr>
-          <p:cNvPr id="229" name="CustomShape 1"/>
+          <p:cNvPr id="230" name="CustomShape 1"/>
           <p:cNvSpPr/>
           <p:nvPr/>
         </p:nvSpPr>
         <p:spPr>
           <a:xfrm>
             <a:off x="755640" y="5078520"/>
-            <a:ext cx="6046920" cy="4810320"/>
+            <a:ext cx="6046560" cy="4809960"/>
           </a:xfrm>
           <a:custGeom>
             <a:avLst/>
@@ -1491,14 +1491,14 @@
       </p:grpSpPr>
       <p:sp>
         <p:nvSpPr>
-          <p:cNvPr id="230" name="CustomShape 1"/>
+          <p:cNvPr id="231" name="CustomShape 1"/>
           <p:cNvSpPr/>
           <p:nvPr/>
         </p:nvSpPr>
         <p:spPr>
           <a:xfrm>
             <a:off x="755640" y="5078520"/>
-            <a:ext cx="6046920" cy="4810320"/>
+            <a:ext cx="6046560" cy="4809960"/>
           </a:xfrm>
           <a:custGeom>
             <a:avLst/>
@@ -1562,14 +1562,14 @@
       </p:grpSpPr>
       <p:sp>
         <p:nvSpPr>
-          <p:cNvPr id="231" name="CustomShape 1"/>
+          <p:cNvPr id="232" name="CustomShape 1"/>
           <p:cNvSpPr/>
           <p:nvPr/>
         </p:nvSpPr>
         <p:spPr>
           <a:xfrm>
             <a:off x="755640" y="5078520"/>
-            <a:ext cx="6046920" cy="4810320"/>
+            <a:ext cx="6046560" cy="4809960"/>
           </a:xfrm>
           <a:custGeom>
             <a:avLst/>
@@ -1633,14 +1633,14 @@
       </p:grpSpPr>
       <p:sp>
         <p:nvSpPr>
-          <p:cNvPr id="232" name="CustomShape 1"/>
+          <p:cNvPr id="233" name="CustomShape 1"/>
           <p:cNvSpPr/>
           <p:nvPr/>
         </p:nvSpPr>
         <p:spPr>
           <a:xfrm>
             <a:off x="755640" y="5078520"/>
-            <a:ext cx="6046920" cy="4810320"/>
+            <a:ext cx="6046560" cy="4809960"/>
           </a:xfrm>
           <a:custGeom>
             <a:avLst/>
@@ -1704,14 +1704,14 @@
       </p:grpSpPr>
       <p:sp>
         <p:nvSpPr>
-          <p:cNvPr id="233" name="CustomShape 1"/>
+          <p:cNvPr id="234" name="CustomShape 1"/>
           <p:cNvSpPr/>
           <p:nvPr/>
         </p:nvSpPr>
         <p:spPr>
           <a:xfrm>
             <a:off x="755640" y="5078520"/>
-            <a:ext cx="6046920" cy="4810320"/>
+            <a:ext cx="6046560" cy="4809960"/>
           </a:xfrm>
           <a:custGeom>
             <a:avLst/>
@@ -1775,14 +1775,14 @@
       </p:grpSpPr>
       <p:sp>
         <p:nvSpPr>
-          <p:cNvPr id="234" name="CustomShape 1"/>
+          <p:cNvPr id="235" name="CustomShape 1"/>
           <p:cNvSpPr/>
           <p:nvPr/>
         </p:nvSpPr>
         <p:spPr>
           <a:xfrm>
             <a:off x="755640" y="5078520"/>
-            <a:ext cx="6046920" cy="4810320"/>
+            <a:ext cx="6046560" cy="4809960"/>
           </a:xfrm>
           <a:custGeom>
             <a:avLst/>
@@ -1846,14 +1846,14 @@
       </p:grpSpPr>
       <p:sp>
         <p:nvSpPr>
-          <p:cNvPr id="235" name="CustomShape 1"/>
+          <p:cNvPr id="236" name="CustomShape 1"/>
           <p:cNvSpPr/>
           <p:nvPr/>
         </p:nvSpPr>
         <p:spPr>
           <a:xfrm>
             <a:off x="755640" y="5078520"/>
-            <a:ext cx="6046920" cy="4810320"/>
+            <a:ext cx="6046560" cy="4809960"/>
           </a:xfrm>
           <a:custGeom>
             <a:avLst/>
@@ -1917,14 +1917,14 @@
       </p:grpSpPr>
       <p:sp>
         <p:nvSpPr>
-          <p:cNvPr id="209" name="CustomShape 1"/>
+          <p:cNvPr id="210" name="CustomShape 1"/>
           <p:cNvSpPr/>
           <p:nvPr/>
         </p:nvSpPr>
         <p:spPr>
           <a:xfrm>
             <a:off x="755640" y="5078520"/>
-            <a:ext cx="6046920" cy="4810320"/>
+            <a:ext cx="6046560" cy="4809960"/>
           </a:xfrm>
           <a:custGeom>
             <a:avLst/>
@@ -1988,14 +1988,14 @@
       </p:grpSpPr>
       <p:sp>
         <p:nvSpPr>
-          <p:cNvPr id="236" name="CustomShape 1"/>
+          <p:cNvPr id="237" name="CustomShape 1"/>
           <p:cNvSpPr/>
           <p:nvPr/>
         </p:nvSpPr>
         <p:spPr>
           <a:xfrm>
             <a:off x="755640" y="5078520"/>
-            <a:ext cx="6046920" cy="4810320"/>
+            <a:ext cx="6046560" cy="4809960"/>
           </a:xfrm>
           <a:custGeom>
             <a:avLst/>
@@ -2059,14 +2059,14 @@
       </p:grpSpPr>
       <p:sp>
         <p:nvSpPr>
-          <p:cNvPr id="237" name="CustomShape 1"/>
+          <p:cNvPr id="238" name="CustomShape 1"/>
           <p:cNvSpPr/>
           <p:nvPr/>
         </p:nvSpPr>
         <p:spPr>
           <a:xfrm>
             <a:off x="755640" y="5078520"/>
-            <a:ext cx="6046920" cy="4810320"/>
+            <a:ext cx="6046560" cy="4809960"/>
           </a:xfrm>
           <a:custGeom>
             <a:avLst/>
@@ -2130,14 +2130,14 @@
       </p:grpSpPr>
       <p:sp>
         <p:nvSpPr>
-          <p:cNvPr id="238" name="CustomShape 1"/>
+          <p:cNvPr id="239" name="CustomShape 1"/>
           <p:cNvSpPr/>
           <p:nvPr/>
         </p:nvSpPr>
         <p:spPr>
           <a:xfrm>
             <a:off x="755640" y="5078520"/>
-            <a:ext cx="6046920" cy="4810320"/>
+            <a:ext cx="6046560" cy="4809960"/>
           </a:xfrm>
           <a:custGeom>
             <a:avLst/>
@@ -2201,14 +2201,14 @@
       </p:grpSpPr>
       <p:sp>
         <p:nvSpPr>
-          <p:cNvPr id="239" name="CustomShape 1"/>
+          <p:cNvPr id="240" name="CustomShape 1"/>
           <p:cNvSpPr/>
           <p:nvPr/>
         </p:nvSpPr>
         <p:spPr>
           <a:xfrm>
             <a:off x="755640" y="5078520"/>
-            <a:ext cx="6046920" cy="4810320"/>
+            <a:ext cx="6046560" cy="4809960"/>
           </a:xfrm>
           <a:custGeom>
             <a:avLst/>
@@ -2272,14 +2272,14 @@
       </p:grpSpPr>
       <p:sp>
         <p:nvSpPr>
-          <p:cNvPr id="240" name="CustomShape 1"/>
+          <p:cNvPr id="241" name="CustomShape 1"/>
           <p:cNvSpPr/>
           <p:nvPr/>
         </p:nvSpPr>
         <p:spPr>
           <a:xfrm>
             <a:off x="755640" y="5078520"/>
-            <a:ext cx="6046920" cy="4810320"/>
+            <a:ext cx="6046560" cy="4809960"/>
           </a:xfrm>
           <a:custGeom>
             <a:avLst/>
@@ -2343,14 +2343,14 @@
       </p:grpSpPr>
       <p:sp>
         <p:nvSpPr>
-          <p:cNvPr id="241" name="CustomShape 1"/>
+          <p:cNvPr id="242" name="CustomShape 1"/>
           <p:cNvSpPr/>
           <p:nvPr/>
         </p:nvSpPr>
         <p:spPr>
           <a:xfrm>
             <a:off x="755640" y="5078520"/>
-            <a:ext cx="6046920" cy="4810320"/>
+            <a:ext cx="6046560" cy="4809960"/>
           </a:xfrm>
           <a:custGeom>
             <a:avLst/>
@@ -2414,14 +2414,14 @@
       </p:grpSpPr>
       <p:sp>
         <p:nvSpPr>
-          <p:cNvPr id="242" name="CustomShape 1"/>
+          <p:cNvPr id="243" name="CustomShape 1"/>
           <p:cNvSpPr/>
           <p:nvPr/>
         </p:nvSpPr>
         <p:spPr>
           <a:xfrm>
             <a:off x="755640" y="5078520"/>
-            <a:ext cx="6046920" cy="4810320"/>
+            <a:ext cx="6046560" cy="4809960"/>
           </a:xfrm>
           <a:custGeom>
             <a:avLst/>
@@ -2485,14 +2485,14 @@
       </p:grpSpPr>
       <p:sp>
         <p:nvSpPr>
-          <p:cNvPr id="243" name="CustomShape 1"/>
+          <p:cNvPr id="244" name="CustomShape 1"/>
           <p:cNvSpPr/>
           <p:nvPr/>
         </p:nvSpPr>
         <p:spPr>
           <a:xfrm>
             <a:off x="755640" y="5078520"/>
-            <a:ext cx="6046920" cy="4810320"/>
+            <a:ext cx="6046560" cy="4809960"/>
           </a:xfrm>
           <a:custGeom>
             <a:avLst/>
@@ -2556,14 +2556,14 @@
       </p:grpSpPr>
       <p:sp>
         <p:nvSpPr>
-          <p:cNvPr id="244" name="CustomShape 1"/>
+          <p:cNvPr id="245" name="CustomShape 1"/>
           <p:cNvSpPr/>
           <p:nvPr/>
         </p:nvSpPr>
         <p:spPr>
           <a:xfrm>
             <a:off x="755640" y="5078520"/>
-            <a:ext cx="6046920" cy="4810320"/>
+            <a:ext cx="6046560" cy="4809960"/>
           </a:xfrm>
           <a:custGeom>
             <a:avLst/>
@@ -2627,14 +2627,14 @@
       </p:grpSpPr>
       <p:sp>
         <p:nvSpPr>
-          <p:cNvPr id="245" name="CustomShape 1"/>
+          <p:cNvPr id="246" name="CustomShape 1"/>
           <p:cNvSpPr/>
           <p:nvPr/>
         </p:nvSpPr>
         <p:spPr>
           <a:xfrm>
             <a:off x="755640" y="5078520"/>
-            <a:ext cx="6046920" cy="4810320"/>
+            <a:ext cx="6046560" cy="4809960"/>
           </a:xfrm>
           <a:custGeom>
             <a:avLst/>
@@ -2698,14 +2698,14 @@
       </p:grpSpPr>
       <p:sp>
         <p:nvSpPr>
-          <p:cNvPr id="210" name="CustomShape 1"/>
+          <p:cNvPr id="211" name="CustomShape 1"/>
           <p:cNvSpPr/>
           <p:nvPr/>
         </p:nvSpPr>
         <p:spPr>
           <a:xfrm>
             <a:off x="755640" y="5078520"/>
-            <a:ext cx="6046920" cy="4810320"/>
+            <a:ext cx="6046560" cy="4809960"/>
           </a:xfrm>
           <a:custGeom>
             <a:avLst/>
@@ -2769,14 +2769,14 @@
       </p:grpSpPr>
       <p:sp>
         <p:nvSpPr>
-          <p:cNvPr id="246" name="CustomShape 1"/>
+          <p:cNvPr id="247" name="CustomShape 1"/>
           <p:cNvSpPr/>
           <p:nvPr/>
         </p:nvSpPr>
         <p:spPr>
           <a:xfrm>
             <a:off x="755640" y="5078520"/>
-            <a:ext cx="6046920" cy="4810320"/>
+            <a:ext cx="6046560" cy="4809960"/>
           </a:xfrm>
           <a:custGeom>
             <a:avLst/>
@@ -2840,14 +2840,14 @@
       </p:grpSpPr>
       <p:sp>
         <p:nvSpPr>
-          <p:cNvPr id="247" name="CustomShape 1"/>
+          <p:cNvPr id="248" name="CustomShape 1"/>
           <p:cNvSpPr/>
           <p:nvPr/>
         </p:nvSpPr>
         <p:spPr>
           <a:xfrm>
             <a:off x="755640" y="5078520"/>
-            <a:ext cx="6046920" cy="4810320"/>
+            <a:ext cx="6046560" cy="4809960"/>
           </a:xfrm>
           <a:custGeom>
             <a:avLst/>
@@ -2911,14 +2911,14 @@
       </p:grpSpPr>
       <p:sp>
         <p:nvSpPr>
-          <p:cNvPr id="248" name="CustomShape 1"/>
+          <p:cNvPr id="249" name="CustomShape 1"/>
           <p:cNvSpPr/>
           <p:nvPr/>
         </p:nvSpPr>
         <p:spPr>
           <a:xfrm>
             <a:off x="755640" y="5078520"/>
-            <a:ext cx="6046920" cy="4810320"/>
+            <a:ext cx="6046560" cy="4809960"/>
           </a:xfrm>
           <a:custGeom>
             <a:avLst/>
@@ -2982,14 +2982,14 @@
       </p:grpSpPr>
       <p:sp>
         <p:nvSpPr>
-          <p:cNvPr id="249" name="CustomShape 1"/>
+          <p:cNvPr id="250" name="CustomShape 1"/>
           <p:cNvSpPr/>
           <p:nvPr/>
         </p:nvSpPr>
         <p:spPr>
           <a:xfrm>
             <a:off x="755640" y="5078520"/>
-            <a:ext cx="6046920" cy="4810320"/>
+            <a:ext cx="6046560" cy="4809960"/>
           </a:xfrm>
           <a:custGeom>
             <a:avLst/>
@@ -3053,14 +3053,14 @@
       </p:grpSpPr>
       <p:sp>
         <p:nvSpPr>
-          <p:cNvPr id="250" name="CustomShape 1"/>
+          <p:cNvPr id="251" name="CustomShape 1"/>
           <p:cNvSpPr/>
           <p:nvPr/>
         </p:nvSpPr>
         <p:spPr>
           <a:xfrm>
             <a:off x="755640" y="5078520"/>
-            <a:ext cx="6046920" cy="4810320"/>
+            <a:ext cx="6046560" cy="4809960"/>
           </a:xfrm>
           <a:custGeom>
             <a:avLst/>
@@ -3124,14 +3124,14 @@
       </p:grpSpPr>
       <p:sp>
         <p:nvSpPr>
-          <p:cNvPr id="251" name="CustomShape 1"/>
+          <p:cNvPr id="252" name="CustomShape 1"/>
           <p:cNvSpPr/>
           <p:nvPr/>
         </p:nvSpPr>
         <p:spPr>
           <a:xfrm>
             <a:off x="755640" y="5078520"/>
-            <a:ext cx="6046920" cy="4810320"/>
+            <a:ext cx="6046560" cy="4809960"/>
           </a:xfrm>
           <a:custGeom>
             <a:avLst/>
@@ -3195,14 +3195,14 @@
       </p:grpSpPr>
       <p:sp>
         <p:nvSpPr>
-          <p:cNvPr id="211" name="CustomShape 1"/>
+          <p:cNvPr id="212" name="CustomShape 1"/>
           <p:cNvSpPr/>
           <p:nvPr/>
         </p:nvSpPr>
         <p:spPr>
           <a:xfrm>
             <a:off x="755640" y="5078520"/>
-            <a:ext cx="6046920" cy="4810320"/>
+            <a:ext cx="6046560" cy="4809960"/>
           </a:xfrm>
           <a:custGeom>
             <a:avLst/>
@@ -3266,14 +3266,14 @@
       </p:grpSpPr>
       <p:sp>
         <p:nvSpPr>
-          <p:cNvPr id="212" name="CustomShape 1"/>
+          <p:cNvPr id="213" name="CustomShape 1"/>
           <p:cNvSpPr/>
           <p:nvPr/>
         </p:nvSpPr>
         <p:spPr>
           <a:xfrm>
             <a:off x="755640" y="5078520"/>
-            <a:ext cx="6046920" cy="4810320"/>
+            <a:ext cx="6046560" cy="4809960"/>
           </a:xfrm>
           <a:custGeom>
             <a:avLst/>
@@ -3337,14 +3337,14 @@
       </p:grpSpPr>
       <p:sp>
         <p:nvSpPr>
-          <p:cNvPr id="213" name="CustomShape 1"/>
+          <p:cNvPr id="214" name="CustomShape 1"/>
           <p:cNvSpPr/>
           <p:nvPr/>
         </p:nvSpPr>
         <p:spPr>
           <a:xfrm>
             <a:off x="755640" y="5078520"/>
-            <a:ext cx="6046920" cy="4810320"/>
+            <a:ext cx="6046560" cy="4809960"/>
           </a:xfrm>
           <a:custGeom>
             <a:avLst/>
@@ -3408,14 +3408,14 @@
       </p:grpSpPr>
       <p:sp>
         <p:nvSpPr>
-          <p:cNvPr id="214" name="CustomShape 1"/>
+          <p:cNvPr id="215" name="CustomShape 1"/>
           <p:cNvSpPr/>
           <p:nvPr/>
         </p:nvSpPr>
         <p:spPr>
           <a:xfrm>
             <a:off x="755640" y="5078520"/>
-            <a:ext cx="6046920" cy="4810320"/>
+            <a:ext cx="6046560" cy="4809960"/>
           </a:xfrm>
           <a:custGeom>
             <a:avLst/>
@@ -3479,14 +3479,14 @@
       </p:grpSpPr>
       <p:sp>
         <p:nvSpPr>
-          <p:cNvPr id="215" name="CustomShape 1"/>
+          <p:cNvPr id="216" name="CustomShape 1"/>
           <p:cNvSpPr/>
           <p:nvPr/>
         </p:nvSpPr>
         <p:spPr>
           <a:xfrm>
             <a:off x="755640" y="5078520"/>
-            <a:ext cx="6046920" cy="4810320"/>
+            <a:ext cx="6046560" cy="4809960"/>
           </a:xfrm>
           <a:custGeom>
             <a:avLst/>
@@ -8012,21 +8012,7 @@
                 </a:uFill>
                 <a:latin typeface="Arial"/>
               </a:rPr>
-              <a:t>Click to edit the title text </a:t>
-            </a:r>
-            <a:r>
-              <a:rPr b="0" lang="en-US" sz="4400" spc="-1" strike="noStrike">
-                <a:solidFill>
-                  <a:srgbClr val="000000"/>
-                </a:solidFill>
-                <a:uFill>
-                  <a:solidFill>
-                    <a:srgbClr val="ffffff"/>
-                  </a:solidFill>
-                </a:uFill>
-                <a:latin typeface="Arial"/>
-              </a:rPr>
-              <a:t>format</a:t>
+              <a:t>Click to edit the title text format</a:t>
             </a:r>
             <a:endParaRPr b="0" lang="en-US" sz="4400" spc="-1" strike="noStrike">
               <a:solidFill>
@@ -9075,7 +9061,7 @@
         <p:spPr>
           <a:xfrm>
             <a:off x="502920" y="301680"/>
-            <a:ext cx="9069480" cy="1260720"/>
+            <a:ext cx="9069120" cy="1260360"/>
           </a:xfrm>
           <a:prstGeom prst="rect">
             <a:avLst/>
@@ -9137,7 +9123,7 @@
         <p:spPr>
           <a:xfrm>
             <a:off x="502920" y="1768320"/>
-            <a:ext cx="9069480" cy="4383360"/>
+            <a:ext cx="9069120" cy="4383000"/>
           </a:xfrm>
           <a:prstGeom prst="rect">
             <a:avLst/>
@@ -9255,7 +9241,7 @@
         <p:spPr>
           <a:xfrm>
             <a:off x="502920" y="549360"/>
-            <a:ext cx="9069480" cy="5942160"/>
+            <a:ext cx="9069120" cy="5941800"/>
           </a:xfrm>
           <a:prstGeom prst="rect">
             <a:avLst/>
@@ -9817,7 +9803,7 @@
         <p:spPr>
           <a:xfrm>
             <a:off x="502920" y="549360"/>
-            <a:ext cx="9069480" cy="5942160"/>
+            <a:ext cx="9069120" cy="5941800"/>
           </a:xfrm>
           <a:prstGeom prst="rect">
             <a:avLst/>
@@ -10451,7 +10437,7 @@
         <p:spPr>
           <a:xfrm>
             <a:off x="502920" y="549360"/>
-            <a:ext cx="9069480" cy="5942160"/>
+            <a:ext cx="9069120" cy="5941800"/>
           </a:xfrm>
           <a:prstGeom prst="rect">
             <a:avLst/>
@@ -11328,7 +11314,7 @@
         <p:spPr>
           <a:xfrm>
             <a:off x="502920" y="549360"/>
-            <a:ext cx="9069480" cy="5942160"/>
+            <a:ext cx="9069120" cy="5941800"/>
           </a:xfrm>
           <a:prstGeom prst="rect">
             <a:avLst/>
@@ -11989,7 +11975,7 @@
         <p:spPr>
           <a:xfrm>
             <a:off x="503280" y="109440"/>
-            <a:ext cx="9096480" cy="711360"/>
+            <a:ext cx="9096120" cy="711000"/>
           </a:xfrm>
           <a:prstGeom prst="rect">
             <a:avLst/>
@@ -12051,7 +12037,7 @@
         <p:spPr>
           <a:xfrm>
             <a:off x="456840" y="1188720"/>
-            <a:ext cx="9069480" cy="6216840"/>
+            <a:ext cx="9069120" cy="6216480"/>
           </a:xfrm>
           <a:prstGeom prst="rect">
             <a:avLst/>
@@ -12136,7 +12122,7 @@
             </a:endParaRPr>
           </a:p>
           <a:p>
-            <a:pPr marL="216000" indent="-214920">
+            <a:pPr marL="216000" indent="-214560">
               <a:lnSpc>
                 <a:spcPct val="98000"/>
               </a:lnSpc>
@@ -12189,7 +12175,7 @@
             </a:endParaRPr>
           </a:p>
           <a:p>
-            <a:pPr marL="216000" indent="-214920">
+            <a:pPr marL="216000" indent="-214560">
               <a:lnSpc>
                 <a:spcPct val="98000"/>
               </a:lnSpc>
@@ -12242,7 +12228,7 @@
             </a:endParaRPr>
           </a:p>
           <a:p>
-            <a:pPr marL="216000" indent="-214920">
+            <a:pPr marL="216000" indent="-214560">
               <a:lnSpc>
                 <a:spcPct val="98000"/>
               </a:lnSpc>
@@ -12295,7 +12281,7 @@
             </a:endParaRPr>
           </a:p>
           <a:p>
-            <a:pPr marL="216000" indent="-214920">
+            <a:pPr marL="216000" indent="-214560">
               <a:lnSpc>
                 <a:spcPct val="98000"/>
               </a:lnSpc>
@@ -12348,7 +12334,7 @@
             </a:endParaRPr>
           </a:p>
           <a:p>
-            <a:pPr marL="216000" indent="-214920">
+            <a:pPr marL="216000" indent="-214560">
               <a:lnSpc>
                 <a:spcPct val="98000"/>
               </a:lnSpc>
@@ -12719,7 +12705,7 @@
             </a:endParaRPr>
           </a:p>
           <a:p>
-            <a:pPr marL="215640" indent="-208080">
+            <a:pPr marL="215640" indent="-207720">
               <a:lnSpc>
                 <a:spcPct val="98000"/>
               </a:lnSpc>
@@ -12752,7 +12738,7 @@
             </a:endParaRPr>
           </a:p>
           <a:p>
-            <a:pPr marL="215640" indent="-208080">
+            <a:pPr marL="215640" indent="-207720">
               <a:lnSpc>
                 <a:spcPct val="98000"/>
               </a:lnSpc>
@@ -12785,7 +12771,7 @@
             </a:endParaRPr>
           </a:p>
           <a:p>
-            <a:pPr marL="215640" indent="-208080">
+            <a:pPr marL="215640" indent="-207720">
               <a:lnSpc>
                 <a:spcPct val="98000"/>
               </a:lnSpc>
@@ -12884,7 +12870,7 @@
         <p:spPr>
           <a:xfrm>
             <a:off x="503280" y="109440"/>
-            <a:ext cx="9096480" cy="711360"/>
+            <a:ext cx="9096120" cy="711000"/>
           </a:xfrm>
           <a:prstGeom prst="rect">
             <a:avLst/>
@@ -12946,7 +12932,7 @@
         <p:spPr>
           <a:xfrm>
             <a:off x="456840" y="1188720"/>
-            <a:ext cx="9069480" cy="6216840"/>
+            <a:ext cx="9069120" cy="6216480"/>
           </a:xfrm>
           <a:prstGeom prst="rect">
             <a:avLst/>
@@ -13031,7 +13017,7 @@
             </a:endParaRPr>
           </a:p>
           <a:p>
-            <a:pPr marL="215640" indent="-208080">
+            <a:pPr marL="215640" indent="-207720">
               <a:lnSpc>
                 <a:spcPct val="98000"/>
               </a:lnSpc>
@@ -13064,7 +13050,7 @@
             </a:endParaRPr>
           </a:p>
           <a:p>
-            <a:pPr marL="215640" indent="-208080">
+            <a:pPr marL="215640" indent="-207720">
               <a:lnSpc>
                 <a:spcPct val="98000"/>
               </a:lnSpc>
@@ -13097,7 +13083,7 @@
             </a:endParaRPr>
           </a:p>
           <a:p>
-            <a:pPr marL="215640" indent="-208080">
+            <a:pPr marL="215640" indent="-207720">
               <a:lnSpc>
                 <a:spcPct val="98000"/>
               </a:lnSpc>
@@ -13140,7 +13126,7 @@
         <p:spPr>
           <a:xfrm>
             <a:off x="455760" y="1189080"/>
-            <a:ext cx="9069480" cy="6216840"/>
+            <a:ext cx="9069120" cy="6216480"/>
           </a:xfrm>
           <a:custGeom>
             <a:avLst/>
@@ -13761,7 +13747,7 @@
         <p:spPr>
           <a:xfrm>
             <a:off x="456840" y="1188720"/>
-            <a:ext cx="9069480" cy="6216840"/>
+            <a:ext cx="9069120" cy="6216480"/>
           </a:xfrm>
           <a:prstGeom prst="rect">
             <a:avLst/>
@@ -13846,7 +13832,7 @@
             </a:endParaRPr>
           </a:p>
           <a:p>
-            <a:pPr marL="215640" indent="-208080">
+            <a:pPr marL="215640" indent="-207720">
               <a:lnSpc>
                 <a:spcPct val="98000"/>
               </a:lnSpc>
@@ -13879,7 +13865,7 @@
             </a:endParaRPr>
           </a:p>
           <a:p>
-            <a:pPr marL="215640" indent="-208080">
+            <a:pPr marL="215640" indent="-207720">
               <a:lnSpc>
                 <a:spcPct val="98000"/>
               </a:lnSpc>
@@ -13912,7 +13898,7 @@
             </a:endParaRPr>
           </a:p>
           <a:p>
-            <a:pPr marL="215640" indent="-208080">
+            <a:pPr marL="215640" indent="-207720">
               <a:lnSpc>
                 <a:spcPct val="98000"/>
               </a:lnSpc>
@@ -13955,7 +13941,7 @@
         <p:spPr>
           <a:xfrm>
             <a:off x="455760" y="1189080"/>
-            <a:ext cx="9069480" cy="6216840"/>
+            <a:ext cx="9069120" cy="6216480"/>
           </a:xfrm>
           <a:custGeom>
             <a:avLst/>
@@ -14468,7 +14454,7 @@
         <p:spPr>
           <a:xfrm>
             <a:off x="456840" y="1188720"/>
-            <a:ext cx="9069480" cy="6216840"/>
+            <a:ext cx="9069120" cy="6216480"/>
           </a:xfrm>
           <a:prstGeom prst="rect">
             <a:avLst/>
@@ -14553,7 +14539,7 @@
             </a:endParaRPr>
           </a:p>
           <a:p>
-            <a:pPr marL="215640" indent="-208080">
+            <a:pPr marL="215640" indent="-207720">
               <a:lnSpc>
                 <a:spcPct val="98000"/>
               </a:lnSpc>
@@ -14586,7 +14572,7 @@
             </a:endParaRPr>
           </a:p>
           <a:p>
-            <a:pPr marL="215640" indent="-208080">
+            <a:pPr marL="215640" indent="-207720">
               <a:lnSpc>
                 <a:spcPct val="98000"/>
               </a:lnSpc>
@@ -14619,7 +14605,7 @@
             </a:endParaRPr>
           </a:p>
           <a:p>
-            <a:pPr marL="215640" indent="-208080">
+            <a:pPr marL="215640" indent="-207720">
               <a:lnSpc>
                 <a:spcPct val="98000"/>
               </a:lnSpc>
@@ -14662,7 +14648,7 @@
         <p:spPr>
           <a:xfrm>
             <a:off x="438120" y="731880"/>
-            <a:ext cx="9069480" cy="6216840"/>
+            <a:ext cx="9069120" cy="6216480"/>
           </a:xfrm>
           <a:custGeom>
             <a:avLst/>
@@ -14704,7 +14690,7 @@
         <p:txBody>
           <a:bodyPr lIns="0" rIns="0" tIns="7200" bIns="0"/>
           <a:p>
-            <a:pPr marL="342720" indent="-335160" algn="ctr">
+            <a:pPr marL="342720" indent="-334800" algn="ctr">
               <a:lnSpc>
                 <a:spcPct val="93000"/>
               </a:lnSpc>
@@ -14737,7 +14723,7 @@
             </a:endParaRPr>
           </a:p>
           <a:p>
-            <a:pPr marL="342720" indent="-335160">
+            <a:pPr marL="342720" indent="-334800">
               <a:lnSpc>
                 <a:spcPct val="98000"/>
               </a:lnSpc>
@@ -14770,7 +14756,7 @@
             </a:endParaRPr>
           </a:p>
           <a:p>
-            <a:pPr marL="342720" indent="-335160">
+            <a:pPr marL="342720" indent="-334800">
               <a:lnSpc>
                 <a:spcPct val="98000"/>
               </a:lnSpc>
@@ -14803,7 +14789,7 @@
             </a:endParaRPr>
           </a:p>
           <a:p>
-            <a:pPr marL="342720" indent="-335160">
+            <a:pPr marL="342720" indent="-334800">
               <a:lnSpc>
                 <a:spcPct val="98000"/>
               </a:lnSpc>
@@ -14836,7 +14822,7 @@
             </a:endParaRPr>
           </a:p>
           <a:p>
-            <a:pPr marL="342720" indent="-335160">
+            <a:pPr marL="342720" indent="-334800">
               <a:lnSpc>
                 <a:spcPct val="98000"/>
               </a:lnSpc>
@@ -14869,7 +14855,7 @@
             </a:endParaRPr>
           </a:p>
           <a:p>
-            <a:pPr marL="342720" indent="-335160">
+            <a:pPr marL="342720" indent="-334800">
               <a:lnSpc>
                 <a:spcPct val="98000"/>
               </a:lnSpc>
@@ -14902,7 +14888,7 @@
             </a:endParaRPr>
           </a:p>
           <a:p>
-            <a:pPr marL="342720" indent="-335160">
+            <a:pPr marL="342720" indent="-334800">
               <a:lnSpc>
                 <a:spcPct val="98000"/>
               </a:lnSpc>
@@ -14965,7 +14951,7 @@
             </a:endParaRPr>
           </a:p>
           <a:p>
-            <a:pPr marL="342720" indent="-335160">
+            <a:pPr marL="342720" indent="-334800">
               <a:lnSpc>
                 <a:spcPct val="98000"/>
               </a:lnSpc>
@@ -15028,7 +15014,7 @@
             </a:endParaRPr>
           </a:p>
           <a:p>
-            <a:pPr marL="342720" indent="-335160">
+            <a:pPr marL="342720" indent="-334800">
               <a:lnSpc>
                 <a:spcPct val="98000"/>
               </a:lnSpc>
@@ -15076,7 +15062,7 @@
             </a:endParaRPr>
           </a:p>
           <a:p>
-            <a:pPr marL="342720" indent="-335160">
+            <a:pPr marL="342720" indent="-334800">
               <a:lnSpc>
                 <a:spcPct val="98000"/>
               </a:lnSpc>
@@ -15109,7 +15095,7 @@
             </a:endParaRPr>
           </a:p>
           <a:p>
-            <a:pPr marL="342720" indent="-335160">
+            <a:pPr marL="342720" indent="-334800">
               <a:lnSpc>
                 <a:spcPct val="98000"/>
               </a:lnSpc>
@@ -15208,7 +15194,7 @@
         <p:spPr>
           <a:xfrm>
             <a:off x="502920" y="549360"/>
-            <a:ext cx="9069480" cy="5942160"/>
+            <a:ext cx="9069120" cy="5941800"/>
           </a:xfrm>
           <a:prstGeom prst="rect">
             <a:avLst/>
@@ -15227,7 +15213,7 @@
         <p:txBody>
           <a:bodyPr lIns="0" rIns="0" tIns="8280" bIns="0"/>
           <a:p>
-            <a:pPr marL="342720" indent="-335160" algn="ctr">
+            <a:pPr marL="342720" indent="-334800" algn="ctr">
               <a:lnSpc>
                 <a:spcPct val="93000"/>
               </a:lnSpc>
@@ -15274,7 +15260,7 @@
         <p:spPr>
           <a:xfrm>
             <a:off x="2057400" y="2179800"/>
-            <a:ext cx="5713560" cy="4037040"/>
+            <a:ext cx="5713200" cy="4036680"/>
           </a:xfrm>
           <a:prstGeom prst="rect">
             <a:avLst/>
@@ -15349,7 +15335,7 @@
         <p:spPr>
           <a:xfrm>
             <a:off x="502920" y="549360"/>
-            <a:ext cx="9069480" cy="5942160"/>
+            <a:ext cx="9069120" cy="5941800"/>
           </a:xfrm>
           <a:prstGeom prst="rect">
             <a:avLst/>
@@ -15481,7 +15467,7 @@
         <p:spPr>
           <a:xfrm>
             <a:off x="1177920" y="182520"/>
-            <a:ext cx="7234560" cy="4380120"/>
+            <a:ext cx="7234200" cy="4379760"/>
           </a:xfrm>
           <a:prstGeom prst="rect">
             <a:avLst/>
@@ -15500,7 +15486,7 @@
         <p:spPr>
           <a:xfrm>
             <a:off x="365040" y="4664160"/>
-            <a:ext cx="9417240" cy="2284560"/>
+            <a:ext cx="9416880" cy="2284200"/>
           </a:xfrm>
           <a:custGeom>
             <a:avLst/>
@@ -15740,7 +15726,7 @@
         <p:spPr>
           <a:xfrm>
             <a:off x="502920" y="301680"/>
-            <a:ext cx="9069480" cy="1260720"/>
+            <a:ext cx="9069120" cy="1260360"/>
           </a:xfrm>
           <a:prstGeom prst="rect">
             <a:avLst/>
@@ -15802,7 +15788,7 @@
         <p:spPr>
           <a:xfrm>
             <a:off x="502920" y="1767960"/>
-            <a:ext cx="9069480" cy="5635800"/>
+            <a:ext cx="9069120" cy="5635440"/>
           </a:xfrm>
           <a:prstGeom prst="rect">
             <a:avLst/>
@@ -15887,7 +15873,7 @@
             </a:endParaRPr>
           </a:p>
           <a:p>
-            <a:pPr marL="431640" indent="-316080">
+            <a:pPr marL="431640" indent="-315720">
               <a:lnSpc>
                 <a:spcPct val="98000"/>
               </a:lnSpc>
@@ -15920,7 +15906,7 @@
             </a:endParaRPr>
           </a:p>
           <a:p>
-            <a:pPr marL="431640" indent="-316080">
+            <a:pPr marL="431640" indent="-315720">
               <a:lnSpc>
                 <a:spcPct val="98000"/>
               </a:lnSpc>
@@ -15953,7 +15939,7 @@
             </a:endParaRPr>
           </a:p>
           <a:p>
-            <a:pPr marL="431640" indent="-316080">
+            <a:pPr marL="431640" indent="-315720">
               <a:lnSpc>
                 <a:spcPct val="98000"/>
               </a:lnSpc>
@@ -16052,7 +16038,7 @@
         <p:spPr>
           <a:xfrm>
             <a:off x="502920" y="549360"/>
-            <a:ext cx="9069480" cy="5942160"/>
+            <a:ext cx="9069120" cy="5941800"/>
           </a:xfrm>
           <a:prstGeom prst="rect">
             <a:avLst/>
@@ -16180,7 +16166,7 @@
         <p:spPr>
           <a:xfrm>
             <a:off x="365040" y="182520"/>
-            <a:ext cx="9417240" cy="6980400"/>
+            <a:ext cx="9416880" cy="6980040"/>
           </a:xfrm>
           <a:custGeom>
             <a:avLst/>
@@ -16222,7 +16208,7 @@
         <p:txBody>
           <a:bodyPr lIns="90000" rIns="90000" tIns="45000" bIns="45000"/>
           <a:p>
-            <a:pPr marL="215640" indent="-214200">
+            <a:pPr marL="215640" indent="-213840">
               <a:lnSpc>
                 <a:spcPct val="93000"/>
               </a:lnSpc>
@@ -16255,7 +16241,7 @@
             </a:endParaRPr>
           </a:p>
           <a:p>
-            <a:pPr marL="215640" indent="-214200">
+            <a:pPr marL="215640" indent="-213840">
               <a:lnSpc>
                 <a:spcPct val="93000"/>
               </a:lnSpc>
@@ -16338,7 +16324,7 @@
             </a:endParaRPr>
           </a:p>
           <a:p>
-            <a:pPr marL="215640" indent="-214200">
+            <a:pPr marL="215640" indent="-213840">
               <a:lnSpc>
                 <a:spcPct val="93000"/>
               </a:lnSpc>
@@ -16371,7 +16357,7 @@
             </a:endParaRPr>
           </a:p>
           <a:p>
-            <a:pPr marL="215640" indent="-214200">
+            <a:pPr marL="215640" indent="-213840">
               <a:lnSpc>
                 <a:spcPct val="93000"/>
               </a:lnSpc>
@@ -16454,7 +16440,7 @@
             </a:endParaRPr>
           </a:p>
           <a:p>
-            <a:pPr marL="215640" indent="-214200">
+            <a:pPr marL="215640" indent="-213840">
               <a:lnSpc>
                 <a:spcPct val="93000"/>
               </a:lnSpc>
@@ -16537,7 +16523,7 @@
             </a:endParaRPr>
           </a:p>
           <a:p>
-            <a:pPr marL="215640" indent="-214200">
+            <a:pPr marL="215640" indent="-213840">
               <a:lnSpc>
                 <a:spcPct val="93000"/>
               </a:lnSpc>
@@ -16620,7 +16606,7 @@
             </a:endParaRPr>
           </a:p>
           <a:p>
-            <a:pPr marL="215640" indent="-214200">
+            <a:pPr marL="215640" indent="-213840">
               <a:lnSpc>
                 <a:spcPct val="93000"/>
               </a:lnSpc>
@@ -16653,7 +16639,7 @@
             </a:endParaRPr>
           </a:p>
           <a:p>
-            <a:pPr marL="215640" indent="-214200">
+            <a:pPr marL="215640" indent="-213840">
               <a:lnSpc>
                 <a:spcPct val="93000"/>
               </a:lnSpc>
@@ -16736,7 +16722,7 @@
             </a:endParaRPr>
           </a:p>
           <a:p>
-            <a:pPr marL="215640" indent="-214200">
+            <a:pPr marL="215640" indent="-213840">
               <a:lnSpc>
                 <a:spcPct val="93000"/>
               </a:lnSpc>
@@ -16819,7 +16805,7 @@
             </a:endParaRPr>
           </a:p>
           <a:p>
-            <a:pPr marL="215640" indent="-214200">
+            <a:pPr marL="215640" indent="-213840">
               <a:lnSpc>
                 <a:spcPct val="93000"/>
               </a:lnSpc>
@@ -16902,7 +16888,7 @@
             </a:endParaRPr>
           </a:p>
           <a:p>
-            <a:pPr marL="215640" indent="-214200">
+            <a:pPr marL="215640" indent="-213840">
               <a:lnSpc>
                 <a:spcPct val="93000"/>
               </a:lnSpc>
@@ -16935,7 +16921,7 @@
             </a:endParaRPr>
           </a:p>
           <a:p>
-            <a:pPr marL="215640" indent="-214200">
+            <a:pPr marL="215640" indent="-213840">
               <a:lnSpc>
                 <a:spcPct val="93000"/>
               </a:lnSpc>
@@ -17018,7 +17004,7 @@
             </a:endParaRPr>
           </a:p>
           <a:p>
-            <a:pPr marL="215640" indent="-214200">
+            <a:pPr marL="215640" indent="-213840">
               <a:lnSpc>
                 <a:spcPct val="93000"/>
               </a:lnSpc>
@@ -17101,7 +17087,7 @@
             </a:endParaRPr>
           </a:p>
           <a:p>
-            <a:pPr marL="215640" indent="-214200">
+            <a:pPr marL="215640" indent="-213840">
               <a:lnSpc>
                 <a:spcPct val="93000"/>
               </a:lnSpc>
@@ -17184,7 +17170,7 @@
             </a:endParaRPr>
           </a:p>
           <a:p>
-            <a:pPr marL="215640" indent="-214200">
+            <a:pPr marL="215640" indent="-213840">
               <a:lnSpc>
                 <a:spcPct val="93000"/>
               </a:lnSpc>
@@ -17333,7 +17319,7 @@
         <p:spPr>
           <a:xfrm>
             <a:off x="502920" y="549360"/>
-            <a:ext cx="9069480" cy="5942160"/>
+            <a:ext cx="9069120" cy="5941800"/>
           </a:xfrm>
           <a:prstGeom prst="rect">
             <a:avLst/>
@@ -17461,7 +17447,7 @@
         <p:spPr>
           <a:xfrm>
             <a:off x="365040" y="365040"/>
-            <a:ext cx="9417240" cy="6581880"/>
+            <a:ext cx="9416880" cy="6581520"/>
           </a:xfrm>
           <a:custGeom>
             <a:avLst/>
@@ -17503,7 +17489,7 @@
         <p:txBody>
           <a:bodyPr lIns="90000" rIns="90000" tIns="45000" bIns="45000"/>
           <a:p>
-            <a:pPr marL="216000" indent="-214920">
+            <a:pPr marL="216000" indent="-214560">
               <a:lnSpc>
                 <a:spcPct val="93000"/>
               </a:lnSpc>
@@ -17586,7 +17572,7 @@
             </a:endParaRPr>
           </a:p>
           <a:p>
-            <a:pPr marL="216000" indent="-214920">
+            <a:pPr marL="216000" indent="-214560">
               <a:lnSpc>
                 <a:spcPct val="93000"/>
               </a:lnSpc>
@@ -17669,7 +17655,7 @@
             </a:endParaRPr>
           </a:p>
           <a:p>
-            <a:pPr marL="216000" indent="-214920">
+            <a:pPr marL="216000" indent="-214560">
               <a:lnSpc>
                 <a:spcPct val="93000"/>
               </a:lnSpc>
@@ -17752,7 +17738,7 @@
             </a:endParaRPr>
           </a:p>
           <a:p>
-            <a:pPr marL="216000" indent="-214920">
+            <a:pPr marL="216000" indent="-214560">
               <a:lnSpc>
                 <a:spcPct val="93000"/>
               </a:lnSpc>
@@ -17835,7 +17821,7 @@
             </a:endParaRPr>
           </a:p>
           <a:p>
-            <a:pPr marL="216000" indent="-214920">
+            <a:pPr marL="216000" indent="-214560">
               <a:lnSpc>
                 <a:spcPct val="93000"/>
               </a:lnSpc>
@@ -17918,7 +17904,7 @@
             </a:endParaRPr>
           </a:p>
           <a:p>
-            <a:pPr marL="216000" indent="-214920">
+            <a:pPr marL="216000" indent="-214560">
               <a:lnSpc>
                 <a:spcPct val="93000"/>
               </a:lnSpc>
@@ -18001,7 +17987,7 @@
             </a:endParaRPr>
           </a:p>
           <a:p>
-            <a:pPr marL="216000" indent="-214920">
+            <a:pPr marL="216000" indent="-214560">
               <a:lnSpc>
                 <a:spcPct val="93000"/>
               </a:lnSpc>
@@ -18084,7 +18070,7 @@
             </a:endParaRPr>
           </a:p>
           <a:p>
-            <a:pPr marL="216000" indent="-214920">
+            <a:pPr marL="216000" indent="-214560">
               <a:lnSpc>
                 <a:spcPct val="93000"/>
               </a:lnSpc>
@@ -18497,7 +18483,7 @@
         <p:spPr>
           <a:xfrm>
             <a:off x="502920" y="549360"/>
-            <a:ext cx="9069480" cy="5942160"/>
+            <a:ext cx="9069120" cy="5941800"/>
           </a:xfrm>
           <a:prstGeom prst="rect">
             <a:avLst/>
@@ -18629,7 +18615,7 @@
         <p:spPr>
           <a:xfrm>
             <a:off x="1641600" y="549360"/>
-            <a:ext cx="6769080" cy="6210360"/>
+            <a:ext cx="6768720" cy="6210000"/>
           </a:xfrm>
           <a:prstGeom prst="rect">
             <a:avLst/>
@@ -18704,7 +18690,7 @@
         <p:spPr>
           <a:xfrm>
             <a:off x="502920" y="549360"/>
-            <a:ext cx="9069480" cy="5942160"/>
+            <a:ext cx="9069120" cy="5941800"/>
           </a:xfrm>
           <a:prstGeom prst="rect">
             <a:avLst/>
@@ -18836,7 +18822,7 @@
         <p:spPr>
           <a:xfrm>
             <a:off x="1417680" y="457200"/>
-            <a:ext cx="7267680" cy="6643800"/>
+            <a:ext cx="7267320" cy="6643440"/>
           </a:xfrm>
           <a:prstGeom prst="rect">
             <a:avLst/>
@@ -18911,7 +18897,7 @@
         <p:spPr>
           <a:xfrm>
             <a:off x="502920" y="549360"/>
-            <a:ext cx="9069480" cy="5942160"/>
+            <a:ext cx="9069120" cy="5941800"/>
           </a:xfrm>
           <a:prstGeom prst="rect">
             <a:avLst/>
@@ -19039,7 +19025,7 @@
         <p:spPr>
           <a:xfrm>
             <a:off x="1279440" y="1279440"/>
-            <a:ext cx="6751800" cy="3106800"/>
+            <a:ext cx="6751440" cy="3106440"/>
           </a:xfrm>
           <a:prstGeom prst="rect">
             <a:avLst/>
@@ -19558,7 +19544,7 @@
         <p:spPr>
           <a:xfrm>
             <a:off x="1468440" y="5183280"/>
-            <a:ext cx="6759720" cy="576360"/>
+            <a:ext cx="6759360" cy="576000"/>
           </a:xfrm>
           <a:custGeom>
             <a:avLst/>
@@ -19611,7 +19597,7 @@
         <p:spPr>
           <a:xfrm>
             <a:off x="731880" y="554040"/>
-            <a:ext cx="5119920" cy="3408480"/>
+            <a:ext cx="5119560" cy="3408120"/>
           </a:xfrm>
           <a:prstGeom prst="rect">
             <a:avLst/>
@@ -19630,7 +19616,7 @@
         <p:spPr>
           <a:xfrm>
             <a:off x="549360" y="1768320"/>
-            <a:ext cx="9016920" cy="5453280"/>
+            <a:ext cx="9016560" cy="5452920"/>
           </a:xfrm>
           <a:custGeom>
             <a:avLst/>
@@ -19781,7 +19767,7 @@
         <p:spPr>
           <a:xfrm>
             <a:off x="457200" y="4114800"/>
-            <a:ext cx="9507600" cy="3735360"/>
+            <a:ext cx="9507240" cy="3735000"/>
           </a:xfrm>
           <a:custGeom>
             <a:avLst/>
@@ -19856,7 +19842,7 @@
             </a:endParaRPr>
           </a:p>
           <a:p>
-            <a:pPr marL="216000" indent="-214920">
+            <a:pPr marL="216000" indent="-214560">
               <a:lnSpc>
                 <a:spcPct val="98000"/>
               </a:lnSpc>
@@ -19909,7 +19895,7 @@
             </a:endParaRPr>
           </a:p>
           <a:p>
-            <a:pPr marL="216000" indent="-214920">
+            <a:pPr marL="216000" indent="-214560">
               <a:lnSpc>
                 <a:spcPct val="98000"/>
               </a:lnSpc>
@@ -19962,7 +19948,7 @@
             </a:endParaRPr>
           </a:p>
           <a:p>
-            <a:pPr marL="216000" indent="-214920">
+            <a:pPr marL="216000" indent="-214560">
               <a:lnSpc>
                 <a:spcPct val="98000"/>
               </a:lnSpc>
@@ -20147,7 +20133,7 @@
         <p:spPr>
           <a:xfrm>
             <a:off x="502920" y="549360"/>
-            <a:ext cx="9069480" cy="5942160"/>
+            <a:ext cx="9069120" cy="5941800"/>
           </a:xfrm>
           <a:prstGeom prst="rect">
             <a:avLst/>
@@ -20275,7 +20261,7 @@
         <p:spPr>
           <a:xfrm>
             <a:off x="1468440" y="5183280"/>
-            <a:ext cx="6759720" cy="576360"/>
+            <a:ext cx="6759360" cy="576000"/>
           </a:xfrm>
           <a:custGeom>
             <a:avLst/>
@@ -20364,7 +20350,7 @@
         <p:spPr>
           <a:xfrm>
             <a:off x="1373040" y="919080"/>
-            <a:ext cx="6305760" cy="4200840"/>
+            <a:ext cx="6305400" cy="4200480"/>
           </a:xfrm>
           <a:prstGeom prst="rect">
             <a:avLst/>
@@ -20439,7 +20425,7 @@
         <p:spPr>
           <a:xfrm>
             <a:off x="502920" y="549360"/>
-            <a:ext cx="9069480" cy="5942160"/>
+            <a:ext cx="9069120" cy="5941800"/>
           </a:xfrm>
           <a:prstGeom prst="rect">
             <a:avLst/>
@@ -20567,7 +20553,7 @@
         <p:spPr>
           <a:xfrm>
             <a:off x="1468440" y="5183280"/>
-            <a:ext cx="6759720" cy="576360"/>
+            <a:ext cx="6759360" cy="576000"/>
           </a:xfrm>
           <a:custGeom>
             <a:avLst/>
@@ -20620,7 +20606,7 @@
         <p:spPr>
           <a:xfrm>
             <a:off x="2011320" y="919080"/>
-            <a:ext cx="6305760" cy="4200840"/>
+            <a:ext cx="6305400" cy="4200480"/>
           </a:xfrm>
           <a:prstGeom prst="rect">
             <a:avLst/>
@@ -20639,7 +20625,7 @@
         <p:spPr>
           <a:xfrm>
             <a:off x="503280" y="5121360"/>
-            <a:ext cx="9279000" cy="576360"/>
+            <a:ext cx="9278640" cy="576000"/>
           </a:xfrm>
           <a:custGeom>
             <a:avLst/>
@@ -20810,7 +20796,7 @@
         <p:spPr>
           <a:xfrm>
             <a:off x="502920" y="549360"/>
-            <a:ext cx="9069480" cy="5942160"/>
+            <a:ext cx="9069120" cy="5941800"/>
           </a:xfrm>
           <a:prstGeom prst="rect">
             <a:avLst/>
@@ -20938,7 +20924,7 @@
         <p:spPr>
           <a:xfrm>
             <a:off x="1468440" y="5183280"/>
-            <a:ext cx="6759720" cy="576360"/>
+            <a:ext cx="6759360" cy="576000"/>
           </a:xfrm>
           <a:custGeom>
             <a:avLst/>
@@ -20991,7 +20977,7 @@
         <p:spPr>
           <a:xfrm>
             <a:off x="2651040" y="554040"/>
-            <a:ext cx="4981680" cy="6027840"/>
+            <a:ext cx="4981320" cy="6027480"/>
           </a:xfrm>
           <a:prstGeom prst="rect">
             <a:avLst/>
@@ -21066,7 +21052,7 @@
         <p:spPr>
           <a:xfrm>
             <a:off x="502920" y="549360"/>
-            <a:ext cx="9069480" cy="5942160"/>
+            <a:ext cx="9069120" cy="5941800"/>
           </a:xfrm>
           <a:prstGeom prst="rect">
             <a:avLst/>
@@ -21194,7 +21180,7 @@
         <p:spPr>
           <a:xfrm>
             <a:off x="1468440" y="5183280"/>
-            <a:ext cx="6759720" cy="576360"/>
+            <a:ext cx="6759360" cy="576000"/>
           </a:xfrm>
           <a:custGeom>
             <a:avLst/>
@@ -21243,7 +21229,7 @@
         <p:spPr>
           <a:xfrm>
             <a:off x="457200" y="457200"/>
-            <a:ext cx="9325080" cy="4753080"/>
+            <a:ext cx="9324720" cy="4752720"/>
           </a:xfrm>
           <a:custGeom>
             <a:avLst/>
@@ -21285,7 +21271,7 @@
         <p:txBody>
           <a:bodyPr lIns="90000" rIns="90000" tIns="45000" bIns="45000"/>
           <a:p>
-            <a:pPr marL="215640" indent="-214200">
+            <a:pPr marL="215640" indent="-213840">
               <a:lnSpc>
                 <a:spcPct val="93000"/>
               </a:lnSpc>
@@ -21368,7 +21354,7 @@
             </a:endParaRPr>
           </a:p>
           <a:p>
-            <a:pPr marL="215640" indent="-214200">
+            <a:pPr marL="215640" indent="-213840">
               <a:lnSpc>
                 <a:spcPct val="93000"/>
               </a:lnSpc>
@@ -21401,7 +21387,7 @@
             </a:endParaRPr>
           </a:p>
           <a:p>
-            <a:pPr marL="215640" indent="-214200">
+            <a:pPr marL="215640" indent="-213840">
               <a:lnSpc>
                 <a:spcPct val="93000"/>
               </a:lnSpc>
@@ -21484,7 +21470,7 @@
             </a:endParaRPr>
           </a:p>
           <a:p>
-            <a:pPr marL="215640" indent="-214200">
+            <a:pPr marL="215640" indent="-213840">
               <a:lnSpc>
                 <a:spcPct val="93000"/>
               </a:lnSpc>
@@ -21517,7 +21503,7 @@
             </a:endParaRPr>
           </a:p>
           <a:p>
-            <a:pPr marL="215640" indent="-214200">
+            <a:pPr marL="215640" indent="-213840">
               <a:lnSpc>
                 <a:spcPct val="93000"/>
               </a:lnSpc>
@@ -21600,7 +21586,7 @@
             </a:endParaRPr>
           </a:p>
           <a:p>
-            <a:pPr marL="215640" indent="-214200">
+            <a:pPr marL="215640" indent="-213840">
               <a:lnSpc>
                 <a:spcPct val="93000"/>
               </a:lnSpc>
@@ -21633,7 +21619,7 @@
             </a:endParaRPr>
           </a:p>
           <a:p>
-            <a:pPr marL="215640" indent="-214200">
+            <a:pPr marL="215640" indent="-213840">
               <a:lnSpc>
                 <a:spcPct val="93000"/>
               </a:lnSpc>
@@ -21716,7 +21702,7 @@
             </a:endParaRPr>
           </a:p>
           <a:p>
-            <a:pPr marL="215640" indent="-214200">
+            <a:pPr marL="215640" indent="-213840">
               <a:lnSpc>
                 <a:spcPct val="93000"/>
               </a:lnSpc>
@@ -21749,7 +21735,7 @@
             </a:endParaRPr>
           </a:p>
           <a:p>
-            <a:pPr marL="215640" indent="-214200">
+            <a:pPr marL="215640" indent="-213840">
               <a:lnSpc>
                 <a:spcPct val="93000"/>
               </a:lnSpc>
@@ -21898,7 +21884,7 @@
         <p:spPr>
           <a:xfrm>
             <a:off x="502920" y="549360"/>
-            <a:ext cx="9069480" cy="5942160"/>
+            <a:ext cx="9069120" cy="5941800"/>
           </a:xfrm>
           <a:prstGeom prst="rect">
             <a:avLst/>
@@ -21917,7 +21903,7 @@
         <p:txBody>
           <a:bodyPr lIns="0" rIns="0" tIns="8280" bIns="0"/>
           <a:p>
-            <a:pPr marL="431640" indent="-316080">
+            <a:pPr marL="431640" indent="-315720">
               <a:lnSpc>
                 <a:spcPct val="98000"/>
               </a:lnSpc>
@@ -21950,7 +21936,7 @@
             </a:endParaRPr>
           </a:p>
           <a:p>
-            <a:pPr marL="431640" indent="-316080">
+            <a:pPr marL="431640" indent="-315720">
               <a:lnSpc>
                 <a:spcPct val="98000"/>
               </a:lnSpc>
@@ -21983,7 +21969,7 @@
             </a:endParaRPr>
           </a:p>
           <a:p>
-            <a:pPr marL="431640" indent="-316080">
+            <a:pPr marL="431640" indent="-315720">
               <a:lnSpc>
                 <a:spcPct val="98000"/>
               </a:lnSpc>
@@ -22016,7 +22002,7 @@
             </a:endParaRPr>
           </a:p>
           <a:p>
-            <a:pPr marL="431640" indent="-316080">
+            <a:pPr marL="431640" indent="-315720">
               <a:lnSpc>
                 <a:spcPct val="98000"/>
               </a:lnSpc>
@@ -22115,7 +22101,7 @@
         <p:spPr>
           <a:xfrm>
             <a:off x="502920" y="549360"/>
-            <a:ext cx="9069480" cy="5942160"/>
+            <a:ext cx="9069120" cy="5941800"/>
           </a:xfrm>
           <a:prstGeom prst="rect">
             <a:avLst/>
@@ -22243,7 +22229,7 @@
         <p:spPr>
           <a:xfrm>
             <a:off x="1468440" y="5183280"/>
-            <a:ext cx="6759720" cy="576360"/>
+            <a:ext cx="6759360" cy="576000"/>
           </a:xfrm>
           <a:custGeom>
             <a:avLst/>
@@ -22332,7 +22318,7 @@
         <p:spPr>
           <a:xfrm>
             <a:off x="2103480" y="1220760"/>
-            <a:ext cx="4753080" cy="3165480"/>
+            <a:ext cx="4752720" cy="3165120"/>
           </a:xfrm>
           <a:prstGeom prst="rect">
             <a:avLst/>
@@ -22407,7 +22393,7 @@
         <p:spPr>
           <a:xfrm>
             <a:off x="502920" y="549360"/>
-            <a:ext cx="9069480" cy="5942160"/>
+            <a:ext cx="9069120" cy="5941800"/>
           </a:xfrm>
           <a:prstGeom prst="rect">
             <a:avLst/>
@@ -22535,7 +22521,7 @@
         <p:spPr>
           <a:xfrm>
             <a:off x="1468440" y="5183280"/>
-            <a:ext cx="6759720" cy="576360"/>
+            <a:ext cx="6759360" cy="576000"/>
           </a:xfrm>
           <a:custGeom>
             <a:avLst/>
@@ -22624,7 +22610,7 @@
         <p:spPr>
           <a:xfrm>
             <a:off x="2103480" y="1220760"/>
-            <a:ext cx="4753080" cy="3165480"/>
+            <a:ext cx="4752720" cy="3165120"/>
           </a:xfrm>
           <a:prstGeom prst="rect">
             <a:avLst/>
@@ -22699,7 +22685,7 @@
         <p:spPr>
           <a:xfrm>
             <a:off x="502920" y="549360"/>
-            <a:ext cx="9069480" cy="5942160"/>
+            <a:ext cx="9069120" cy="5941800"/>
           </a:xfrm>
           <a:prstGeom prst="rect">
             <a:avLst/>
@@ -22827,7 +22813,7 @@
         <p:spPr>
           <a:xfrm>
             <a:off x="1468440" y="5183280"/>
-            <a:ext cx="6759720" cy="576360"/>
+            <a:ext cx="6759360" cy="576000"/>
           </a:xfrm>
           <a:custGeom>
             <a:avLst/>
@@ -22916,7 +22902,7 @@
         <p:spPr>
           <a:xfrm>
             <a:off x="2103480" y="1220760"/>
-            <a:ext cx="5943240" cy="3958200"/>
+            <a:ext cx="5942880" cy="3957840"/>
           </a:xfrm>
           <a:prstGeom prst="rect">
             <a:avLst/>
@@ -22991,7 +22977,7 @@
         <p:spPr>
           <a:xfrm>
             <a:off x="502920" y="549360"/>
-            <a:ext cx="9069480" cy="5942160"/>
+            <a:ext cx="9069120" cy="5941800"/>
           </a:xfrm>
           <a:prstGeom prst="rect">
             <a:avLst/>
@@ -23119,7 +23105,7 @@
         <p:spPr>
           <a:xfrm>
             <a:off x="1468440" y="5183280"/>
-            <a:ext cx="6759720" cy="576360"/>
+            <a:ext cx="6759360" cy="576000"/>
           </a:xfrm>
           <a:custGeom>
             <a:avLst/>
@@ -23179,7 +23165,7 @@
                 <a:latin typeface="Georgia"/>
                 <a:ea typeface="DejaVu Sans"/>
               </a:rPr>
-              <a:t>The man is walking through the jungle. </a:t>
+              <a:t>. </a:t>
             </a:r>
             <a:endParaRPr b="0" lang="en-US" sz="1800" spc="-1" strike="noStrike">
               <a:solidFill>
@@ -23207,8 +23193,8 @@
         </p:blipFill>
         <p:spPr>
           <a:xfrm>
-            <a:off x="2103480" y="1220760"/>
-            <a:ext cx="5943240" cy="3958200"/>
+            <a:off x="1920240" y="1098720"/>
+            <a:ext cx="6126120" cy="4079880"/>
           </a:xfrm>
           <a:prstGeom prst="rect">
             <a:avLst/>
@@ -23218,6 +23204,62 @@
           </a:ln>
         </p:spPr>
       </p:pic>
+      <p:sp>
+        <p:nvSpPr>
+          <p:cNvPr id="182" name="TextShape 3"/>
+          <p:cNvSpPr txBox="1"/>
+          <p:nvPr/>
+        </p:nvSpPr>
+        <p:spPr>
+          <a:xfrm>
+            <a:off x="731520" y="5212080"/>
+            <a:ext cx="8412480" cy="564480"/>
+          </a:xfrm>
+          <a:prstGeom prst="rect">
+            <a:avLst/>
+          </a:prstGeom>
+          <a:noFill/>
+          <a:ln>
+            <a:noFill/>
+          </a:ln>
+        </p:spPr>
+        <p:txBody>
+          <a:bodyPr lIns="90000" rIns="90000" tIns="45000" bIns="45000"/>
+          <a:p>
+            <a:pPr>
+              <a:lnSpc>
+                <a:spcPct val="98000"/>
+              </a:lnSpc>
+            </a:pPr>
+            <a:r>
+              <a:rPr b="0" lang="en-US" sz="3200" spc="-1" strike="noStrike">
+                <a:solidFill>
+                  <a:srgbClr val="1c1c1c"/>
+                </a:solidFill>
+                <a:uFill>
+                  <a:solidFill>
+                    <a:srgbClr val="ffffff"/>
+                  </a:solidFill>
+                </a:uFill>
+                <a:latin typeface="Georgia"/>
+                <a:ea typeface="DejaVu Sans"/>
+              </a:rPr>
+              <a:t>The man is walking through the jungle. </a:t>
+            </a:r>
+            <a:endParaRPr b="0" lang="en-US" sz="1800" spc="-1" strike="noStrike">
+              <a:solidFill>
+                <a:srgbClr val="000000"/>
+              </a:solidFill>
+              <a:uFill>
+                <a:solidFill>
+                  <a:srgbClr val="ffffff"/>
+                </a:solidFill>
+              </a:uFill>
+              <a:latin typeface="Arial"/>
+            </a:endParaRPr>
+          </a:p>
+        </p:txBody>
+      </p:sp>
     </p:spTree>
   </p:cSld>
   <p:timing>
@@ -23276,14 +23318,14 @@
       </p:grpSpPr>
       <p:sp>
         <p:nvSpPr>
-          <p:cNvPr id="182" name="CustomShape 1"/>
+          <p:cNvPr id="183" name="CustomShape 1"/>
           <p:cNvSpPr/>
           <p:nvPr/>
         </p:nvSpPr>
         <p:spPr>
           <a:xfrm>
             <a:off x="456840" y="1188720"/>
-            <a:ext cx="9069480" cy="6216840"/>
+            <a:ext cx="9069120" cy="6216480"/>
           </a:xfrm>
           <a:prstGeom prst="rect">
             <a:avLst/>
@@ -23368,7 +23410,7 @@
             </a:endParaRPr>
           </a:p>
           <a:p>
-            <a:pPr marL="215640" indent="-208080">
+            <a:pPr marL="215640" indent="-207720">
               <a:lnSpc>
                 <a:spcPct val="98000"/>
               </a:lnSpc>
@@ -23401,7 +23443,7 @@
             </a:endParaRPr>
           </a:p>
           <a:p>
-            <a:pPr marL="215640" indent="-208080">
+            <a:pPr marL="215640" indent="-207720">
               <a:lnSpc>
                 <a:spcPct val="98000"/>
               </a:lnSpc>
@@ -23434,7 +23476,7 @@
             </a:endParaRPr>
           </a:p>
           <a:p>
-            <a:pPr marL="215640" indent="-208080">
+            <a:pPr marL="215640" indent="-207720">
               <a:lnSpc>
                 <a:spcPct val="98000"/>
               </a:lnSpc>
@@ -23470,14 +23512,14 @@
       </p:sp>
       <p:sp>
         <p:nvSpPr>
-          <p:cNvPr id="183" name="CustomShape 2"/>
+          <p:cNvPr id="184" name="CustomShape 2"/>
           <p:cNvSpPr/>
           <p:nvPr/>
         </p:nvSpPr>
         <p:spPr>
           <a:xfrm>
             <a:off x="438120" y="731880"/>
-            <a:ext cx="9069480" cy="6216840"/>
+            <a:ext cx="9069120" cy="6216480"/>
           </a:xfrm>
           <a:custGeom>
             <a:avLst/>
@@ -23519,7 +23561,7 @@
         <p:txBody>
           <a:bodyPr lIns="0" rIns="0" tIns="7200" bIns="0"/>
           <a:p>
-            <a:pPr marL="342720" indent="-335160">
+            <a:pPr marL="342720" indent="-334800">
               <a:lnSpc>
                 <a:spcPct val="93000"/>
               </a:lnSpc>
@@ -23552,7 +23594,7 @@
             </a:endParaRPr>
           </a:p>
           <a:p>
-            <a:pPr marL="342720" indent="-335160">
+            <a:pPr>
               <a:lnSpc>
                 <a:spcPct val="98000"/>
               </a:lnSpc>
@@ -23585,7 +23627,7 @@
             </a:endParaRPr>
           </a:p>
           <a:p>
-            <a:pPr marL="342720" indent="-335160">
+            <a:pPr marL="342720" indent="-334800">
               <a:lnSpc>
                 <a:spcPct val="98000"/>
               </a:lnSpc>
@@ -23638,7 +23680,7 @@
             </a:endParaRPr>
           </a:p>
           <a:p>
-            <a:pPr marL="342720" indent="-335160">
+            <a:pPr marL="342720" indent="-334800">
               <a:lnSpc>
                 <a:spcPct val="98000"/>
               </a:lnSpc>
@@ -23691,7 +23733,7 @@
             </a:endParaRPr>
           </a:p>
           <a:p>
-            <a:pPr marL="342720" indent="-335160">
+            <a:pPr marL="342720" indent="-334800">
               <a:lnSpc>
                 <a:spcPct val="98000"/>
               </a:lnSpc>
@@ -23744,7 +23786,7 @@
             </a:endParaRPr>
           </a:p>
           <a:p>
-            <a:pPr marL="342720" indent="-335160">
+            <a:pPr marL="342720" indent="-334800">
               <a:lnSpc>
                 <a:spcPct val="98000"/>
               </a:lnSpc>
@@ -23797,7 +23839,7 @@
             </a:endParaRPr>
           </a:p>
           <a:p>
-            <a:pPr marL="342720" indent="-335160">
+            <a:pPr marL="342720" indent="-334800">
               <a:lnSpc>
                 <a:spcPct val="98000"/>
               </a:lnSpc>
@@ -23850,7 +23892,7 @@
             </a:endParaRPr>
           </a:p>
           <a:p>
-            <a:pPr marL="342720" indent="-335160">
+            <a:pPr marL="342720" indent="-334800">
               <a:lnSpc>
                 <a:spcPct val="98000"/>
               </a:lnSpc>
@@ -23903,7 +23945,7 @@
             </a:endParaRPr>
           </a:p>
           <a:p>
-            <a:pPr marL="342720" indent="-335160">
+            <a:pPr marL="342720" indent="-334800">
               <a:lnSpc>
                 <a:spcPct val="98000"/>
               </a:lnSpc>
@@ -23956,7 +23998,7 @@
             </a:endParaRPr>
           </a:p>
           <a:p>
-            <a:pPr marL="342720" indent="-335160">
+            <a:pPr marL="342720" indent="-334800">
               <a:lnSpc>
                 <a:spcPct val="98000"/>
               </a:lnSpc>
@@ -24009,7 +24051,7 @@
             </a:endParaRPr>
           </a:p>
           <a:p>
-            <a:pPr marL="342720" indent="-335160">
+            <a:pPr marL="342720" indent="-334800">
               <a:lnSpc>
                 <a:spcPct val="98000"/>
               </a:lnSpc>
@@ -24042,7 +24084,7 @@
             </a:endParaRPr>
           </a:p>
           <a:p>
-            <a:pPr marL="342720" indent="-335160">
+            <a:pPr marL="342720" indent="-334800">
               <a:lnSpc>
                 <a:spcPct val="98000"/>
               </a:lnSpc>
@@ -24075,7 +24117,7 @@
             </a:endParaRPr>
           </a:p>
           <a:p>
-            <a:pPr marL="342720" indent="-335160">
+            <a:pPr marL="342720" indent="-334800">
               <a:lnSpc>
                 <a:spcPct val="98000"/>
               </a:lnSpc>
@@ -24108,7 +24150,7 @@
             </a:endParaRPr>
           </a:p>
           <a:p>
-            <a:pPr marL="342720" indent="-335160" algn="ctr">
+            <a:pPr marL="342720" indent="-334800" algn="ctr">
               <a:lnSpc>
                 <a:spcPct val="93000"/>
               </a:lnSpc>
@@ -24200,14 +24242,14 @@
       </p:grpSpPr>
       <p:sp>
         <p:nvSpPr>
-          <p:cNvPr id="184" name="CustomShape 1"/>
+          <p:cNvPr id="185" name="CustomShape 1"/>
           <p:cNvSpPr/>
           <p:nvPr/>
         </p:nvSpPr>
         <p:spPr>
           <a:xfrm>
             <a:off x="456840" y="1188720"/>
-            <a:ext cx="9069480" cy="6216840"/>
+            <a:ext cx="9069120" cy="6216480"/>
           </a:xfrm>
           <a:prstGeom prst="rect">
             <a:avLst/>
@@ -24292,7 +24334,7 @@
             </a:endParaRPr>
           </a:p>
           <a:p>
-            <a:pPr marL="215640" indent="-208080">
+            <a:pPr marL="215640" indent="-207720">
               <a:lnSpc>
                 <a:spcPct val="98000"/>
               </a:lnSpc>
@@ -24325,7 +24367,7 @@
             </a:endParaRPr>
           </a:p>
           <a:p>
-            <a:pPr marL="215640" indent="-208080">
+            <a:pPr marL="215640" indent="-207720">
               <a:lnSpc>
                 <a:spcPct val="98000"/>
               </a:lnSpc>
@@ -24358,7 +24400,7 @@
             </a:endParaRPr>
           </a:p>
           <a:p>
-            <a:pPr marL="215640" indent="-208080">
+            <a:pPr marL="215640" indent="-207720">
               <a:lnSpc>
                 <a:spcPct val="98000"/>
               </a:lnSpc>
@@ -24394,14 +24436,14 @@
       </p:sp>
       <p:sp>
         <p:nvSpPr>
-          <p:cNvPr id="185" name="CustomShape 2"/>
+          <p:cNvPr id="186" name="CustomShape 2"/>
           <p:cNvSpPr/>
           <p:nvPr/>
         </p:nvSpPr>
         <p:spPr>
           <a:xfrm>
             <a:off x="438120" y="731880"/>
-            <a:ext cx="9069480" cy="6216840"/>
+            <a:ext cx="9069120" cy="6216480"/>
           </a:xfrm>
           <a:custGeom>
             <a:avLst/>
@@ -24443,7 +24485,7 @@
         <p:txBody>
           <a:bodyPr lIns="0" rIns="0" tIns="7200" bIns="0"/>
           <a:p>
-            <a:pPr marL="342720" indent="-335160">
+            <a:pPr marL="342720" indent="-334800">
               <a:lnSpc>
                 <a:spcPct val="93000"/>
               </a:lnSpc>
@@ -24524,7 +24566,7 @@
             </a:endParaRPr>
           </a:p>
           <a:p>
-            <a:pPr marL="342720" indent="-335160">
+            <a:pPr marL="342720" indent="-334800">
               <a:lnSpc>
                 <a:spcPct val="93000"/>
               </a:lnSpc>
@@ -24679,14 +24721,14 @@
       </p:grpSpPr>
       <p:sp>
         <p:nvSpPr>
-          <p:cNvPr id="186" name="CustomShape 1"/>
+          <p:cNvPr id="187" name="CustomShape 1"/>
           <p:cNvSpPr/>
           <p:nvPr/>
         </p:nvSpPr>
         <p:spPr>
           <a:xfrm>
             <a:off x="456840" y="1188720"/>
-            <a:ext cx="9069480" cy="6216840"/>
+            <a:ext cx="9069120" cy="6216480"/>
           </a:xfrm>
           <a:prstGeom prst="rect">
             <a:avLst/>
@@ -24771,7 +24813,7 @@
             </a:endParaRPr>
           </a:p>
           <a:p>
-            <a:pPr marL="215640" indent="-208080">
+            <a:pPr marL="215640" indent="-207720">
               <a:lnSpc>
                 <a:spcPct val="98000"/>
               </a:lnSpc>
@@ -24804,7 +24846,7 @@
             </a:endParaRPr>
           </a:p>
           <a:p>
-            <a:pPr marL="215640" indent="-208080">
+            <a:pPr marL="215640" indent="-207720">
               <a:lnSpc>
                 <a:spcPct val="98000"/>
               </a:lnSpc>
@@ -24837,7 +24879,7 @@
             </a:endParaRPr>
           </a:p>
           <a:p>
-            <a:pPr marL="215640" indent="-208080">
+            <a:pPr marL="215640" indent="-207720">
               <a:lnSpc>
                 <a:spcPct val="98000"/>
               </a:lnSpc>
@@ -24873,14 +24915,14 @@
       </p:sp>
       <p:sp>
         <p:nvSpPr>
-          <p:cNvPr id="187" name="CustomShape 2"/>
+          <p:cNvPr id="188" name="CustomShape 2"/>
           <p:cNvSpPr/>
           <p:nvPr/>
         </p:nvSpPr>
         <p:spPr>
           <a:xfrm>
             <a:off x="438120" y="731880"/>
-            <a:ext cx="9069480" cy="6216840"/>
+            <a:ext cx="9069120" cy="6216480"/>
           </a:xfrm>
           <a:custGeom>
             <a:avLst/>
@@ -24922,7 +24964,7 @@
         <p:txBody>
           <a:bodyPr lIns="0" rIns="0" tIns="7200" bIns="0"/>
           <a:p>
-            <a:pPr marL="342720" indent="-335160" algn="ctr">
+            <a:pPr marL="342720" indent="-334800" algn="ctr">
               <a:lnSpc>
                 <a:spcPct val="93000"/>
               </a:lnSpc>
@@ -24955,7 +24997,7 @@
             </a:endParaRPr>
           </a:p>
           <a:p>
-            <a:pPr marL="342720" indent="-335160">
+            <a:pPr marL="342720" indent="-334800">
               <a:lnSpc>
                 <a:spcPct val="93000"/>
               </a:lnSpc>
@@ -24988,7 +25030,7 @@
             </a:endParaRPr>
           </a:p>
           <a:p>
-            <a:pPr marL="342720" indent="-335160">
+            <a:pPr marL="342720" indent="-334800">
               <a:lnSpc>
                 <a:spcPct val="93000"/>
               </a:lnSpc>
@@ -25021,7 +25063,7 @@
             </a:endParaRPr>
           </a:p>
           <a:p>
-            <a:pPr marL="342720" indent="-335160">
+            <a:pPr marL="342720" indent="-334800">
               <a:lnSpc>
                 <a:spcPct val="93000"/>
               </a:lnSpc>
@@ -25054,7 +25096,7 @@
             </a:endParaRPr>
           </a:p>
           <a:p>
-            <a:pPr marL="342720" indent="-335160">
+            <a:pPr marL="342720" indent="-334800">
               <a:lnSpc>
                 <a:spcPct val="93000"/>
               </a:lnSpc>
@@ -25087,13 +25129,13 @@
             </a:endParaRPr>
           </a:p>
           <a:p>
-            <a:pPr marL="342720" indent="-335160">
+            <a:pPr marL="342720" indent="-334800">
               <a:lnSpc>
                 <a:spcPct val="93000"/>
               </a:lnSpc>
             </a:pPr>
             <a:r>
-              <a:rPr b="0" lang="en-US" sz="3600" spc="-1" strike="noStrike">
+              <a:rPr b="0" lang="en-US" sz="3600" spc="-1" strike="sngStrike">
                 <a:solidFill>
                   <a:srgbClr val="000000"/>
                 </a:solidFill>
@@ -25120,7 +25162,7 @@
             </a:endParaRPr>
           </a:p>
           <a:p>
-            <a:pPr marL="342720" indent="-335160">
+            <a:pPr marL="342720" indent="-334800">
               <a:lnSpc>
                 <a:spcPct val="93000"/>
               </a:lnSpc>
@@ -25212,14 +25254,14 @@
       </p:grpSpPr>
       <p:sp>
         <p:nvSpPr>
-          <p:cNvPr id="188" name="CustomShape 1"/>
+          <p:cNvPr id="189" name="CustomShape 1"/>
           <p:cNvSpPr/>
           <p:nvPr/>
         </p:nvSpPr>
         <p:spPr>
           <a:xfrm>
             <a:off x="456840" y="1188720"/>
-            <a:ext cx="9069480" cy="6216840"/>
+            <a:ext cx="9069120" cy="6216480"/>
           </a:xfrm>
           <a:prstGeom prst="rect">
             <a:avLst/>
@@ -25304,7 +25346,7 @@
             </a:endParaRPr>
           </a:p>
           <a:p>
-            <a:pPr marL="215640" indent="-208080">
+            <a:pPr marL="215640" indent="-207720">
               <a:lnSpc>
                 <a:spcPct val="98000"/>
               </a:lnSpc>
@@ -25337,7 +25379,7 @@
             </a:endParaRPr>
           </a:p>
           <a:p>
-            <a:pPr marL="215640" indent="-208080">
+            <a:pPr marL="215640" indent="-207720">
               <a:lnSpc>
                 <a:spcPct val="98000"/>
               </a:lnSpc>
@@ -25370,7 +25412,7 @@
             </a:endParaRPr>
           </a:p>
           <a:p>
-            <a:pPr marL="215640" indent="-208080">
+            <a:pPr marL="215640" indent="-207720">
               <a:lnSpc>
                 <a:spcPct val="98000"/>
               </a:lnSpc>
@@ -25406,14 +25448,14 @@
       </p:sp>
       <p:sp>
         <p:nvSpPr>
-          <p:cNvPr id="189" name="CustomShape 2"/>
+          <p:cNvPr id="190" name="CustomShape 2"/>
           <p:cNvSpPr/>
           <p:nvPr/>
         </p:nvSpPr>
         <p:spPr>
           <a:xfrm>
             <a:off x="438120" y="731880"/>
-            <a:ext cx="9069480" cy="6216840"/>
+            <a:ext cx="9069120" cy="6216480"/>
           </a:xfrm>
           <a:custGeom>
             <a:avLst/>
@@ -25455,7 +25497,7 @@
         <p:txBody>
           <a:bodyPr lIns="0" rIns="0" tIns="7200" bIns="0"/>
           <a:p>
-            <a:pPr marL="342720" indent="-335160" algn="ctr">
+            <a:pPr marL="342720" indent="-334800" algn="ctr">
               <a:lnSpc>
                 <a:spcPct val="93000"/>
               </a:lnSpc>
@@ -25518,7 +25560,7 @@
             </a:endParaRPr>
           </a:p>
           <a:p>
-            <a:pPr marL="342720" indent="-335160">
+            <a:pPr marL="342720" indent="-334800">
               <a:lnSpc>
                 <a:spcPct val="93000"/>
               </a:lnSpc>
@@ -25566,7 +25608,7 @@
             </a:endParaRPr>
           </a:p>
           <a:p>
-            <a:pPr marL="342720" indent="-335160">
+            <a:pPr marL="342720" indent="-334800">
               <a:lnSpc>
                 <a:spcPct val="93000"/>
               </a:lnSpc>
@@ -25644,7 +25686,7 @@
             </a:endParaRPr>
           </a:p>
           <a:p>
-            <a:pPr marL="342720" indent="-335160">
+            <a:pPr marL="342720" indent="-334800">
               <a:lnSpc>
                 <a:spcPct val="93000"/>
               </a:lnSpc>
@@ -25662,7 +25704,7 @@
             </a:endParaRPr>
           </a:p>
           <a:p>
-            <a:pPr marL="338040" indent="-336600">
+            <a:pPr marL="338040" indent="-336240">
               <a:lnSpc>
                 <a:spcPct val="93000"/>
               </a:lnSpc>
@@ -25745,7 +25787,7 @@
             </a:endParaRPr>
           </a:p>
           <a:p>
-            <a:pPr marL="338040" indent="-336600">
+            <a:pPr marL="338040" indent="-336240">
               <a:lnSpc>
                 <a:spcPct val="93000"/>
               </a:lnSpc>
@@ -25828,7 +25870,7 @@
             </a:endParaRPr>
           </a:p>
           <a:p>
-            <a:pPr marL="338040" indent="-336600">
+            <a:pPr marL="338040" indent="-336240">
               <a:lnSpc>
                 <a:spcPct val="93000"/>
               </a:lnSpc>
@@ -25911,7 +25953,7 @@
             </a:endParaRPr>
           </a:p>
           <a:p>
-            <a:pPr marL="338040" indent="-336600">
+            <a:pPr marL="338040" indent="-336240">
               <a:lnSpc>
                 <a:spcPct val="93000"/>
               </a:lnSpc>
@@ -25994,7 +26036,7 @@
             </a:endParaRPr>
           </a:p>
           <a:p>
-            <a:pPr marL="338040" indent="-336600">
+            <a:pPr marL="338040" indent="-336240">
               <a:lnSpc>
                 <a:spcPct val="93000"/>
               </a:lnSpc>
@@ -26077,7 +26119,7 @@
             </a:endParaRPr>
           </a:p>
           <a:p>
-            <a:pPr marL="342720" indent="-335160">
+            <a:pPr marL="342720" indent="-334800">
               <a:lnSpc>
                 <a:spcPct val="93000"/>
               </a:lnSpc>
@@ -26110,7 +26152,7 @@
             </a:endParaRPr>
           </a:p>
           <a:p>
-            <a:pPr marL="342720" indent="-335160">
+            <a:pPr marL="342720" indent="-334800">
               <a:lnSpc>
                 <a:spcPct val="93000"/>
               </a:lnSpc>
@@ -26143,7 +26185,7 @@
             </a:endParaRPr>
           </a:p>
           <a:p>
-            <a:pPr marL="342720" indent="-335160">
+            <a:pPr marL="342720" indent="-334800">
               <a:lnSpc>
                 <a:spcPct val="93000"/>
               </a:lnSpc>
@@ -26176,7 +26218,7 @@
             </a:endParaRPr>
           </a:p>
           <a:p>
-            <a:pPr marL="342720" indent="-335160">
+            <a:pPr marL="342720" indent="-334800">
               <a:lnSpc>
                 <a:spcPct val="93000"/>
               </a:lnSpc>
@@ -26209,7 +26251,7 @@
             </a:endParaRPr>
           </a:p>
           <a:p>
-            <a:pPr marL="342720" indent="-335160">
+            <a:pPr marL="342720" indent="-334800">
               <a:lnSpc>
                 <a:spcPct val="93000"/>
               </a:lnSpc>
@@ -26242,7 +26284,7 @@
             </a:endParaRPr>
           </a:p>
           <a:p>
-            <a:pPr marL="342720" indent="-335160">
+            <a:pPr marL="342720" indent="-334800">
               <a:lnSpc>
                 <a:spcPct val="93000"/>
               </a:lnSpc>
@@ -26275,7 +26317,7 @@
             </a:endParaRPr>
           </a:p>
           <a:p>
-            <a:pPr marL="342720" indent="-335160">
+            <a:pPr marL="342720" indent="-334800">
               <a:lnSpc>
                 <a:spcPct val="93000"/>
               </a:lnSpc>
@@ -26367,14 +26409,14 @@
       </p:grpSpPr>
       <p:sp>
         <p:nvSpPr>
-          <p:cNvPr id="190" name="CustomShape 1"/>
+          <p:cNvPr id="191" name="CustomShape 1"/>
           <p:cNvSpPr/>
           <p:nvPr/>
         </p:nvSpPr>
         <p:spPr>
           <a:xfrm>
             <a:off x="456840" y="1188720"/>
-            <a:ext cx="9069480" cy="6216840"/>
+            <a:ext cx="9069120" cy="6216480"/>
           </a:xfrm>
           <a:prstGeom prst="rect">
             <a:avLst/>
@@ -26459,7 +26501,7 @@
             </a:endParaRPr>
           </a:p>
           <a:p>
-            <a:pPr marL="215640" indent="-208080">
+            <a:pPr marL="215640" indent="-207720">
               <a:lnSpc>
                 <a:spcPct val="98000"/>
               </a:lnSpc>
@@ -26492,7 +26534,7 @@
             </a:endParaRPr>
           </a:p>
           <a:p>
-            <a:pPr marL="215640" indent="-208080">
+            <a:pPr marL="215640" indent="-207720">
               <a:lnSpc>
                 <a:spcPct val="98000"/>
               </a:lnSpc>
@@ -26525,7 +26567,7 @@
             </a:endParaRPr>
           </a:p>
           <a:p>
-            <a:pPr marL="215640" indent="-208080">
+            <a:pPr marL="215640" indent="-207720">
               <a:lnSpc>
                 <a:spcPct val="98000"/>
               </a:lnSpc>
@@ -26561,14 +26603,14 @@
       </p:sp>
       <p:sp>
         <p:nvSpPr>
-          <p:cNvPr id="191" name="CustomShape 2"/>
+          <p:cNvPr id="192" name="CustomShape 2"/>
           <p:cNvSpPr/>
           <p:nvPr/>
         </p:nvSpPr>
         <p:spPr>
           <a:xfrm>
             <a:off x="438120" y="731880"/>
-            <a:ext cx="9069480" cy="6216840"/>
+            <a:ext cx="9069120" cy="6216480"/>
           </a:xfrm>
           <a:custGeom>
             <a:avLst/>
@@ -26610,7 +26652,7 @@
         <p:txBody>
           <a:bodyPr lIns="0" rIns="0" tIns="7200" bIns="0"/>
           <a:p>
-            <a:pPr marL="342720" indent="-335160" algn="ctr">
+            <a:pPr marL="342720" indent="-334800" algn="ctr">
               <a:lnSpc>
                 <a:spcPct val="93000"/>
               </a:lnSpc>
@@ -26643,7 +26685,7 @@
             </a:endParaRPr>
           </a:p>
           <a:p>
-            <a:pPr marL="342720" indent="-335160" algn="ctr">
+            <a:pPr marL="342720" indent="-334800" algn="ctr">
               <a:lnSpc>
                 <a:spcPct val="93000"/>
               </a:lnSpc>
@@ -26661,7 +26703,7 @@
             </a:endParaRPr>
           </a:p>
           <a:p>
-            <a:pPr marL="342720" indent="-335160">
+            <a:pPr>
               <a:lnSpc>
                 <a:spcPct val="93000"/>
               </a:lnSpc>
@@ -26694,7 +26736,7 @@
             </a:endParaRPr>
           </a:p>
           <a:p>
-            <a:pPr marL="342720" indent="-335160">
+            <a:pPr marL="342720" indent="-334800">
               <a:lnSpc>
                 <a:spcPct val="93000"/>
               </a:lnSpc>
@@ -26712,7 +26754,7 @@
             </a:endParaRPr>
           </a:p>
           <a:p>
-            <a:pPr marL="342720" indent="-335160">
+            <a:pPr marL="342720" indent="-334800">
               <a:lnSpc>
                 <a:spcPct val="93000"/>
               </a:lnSpc>
@@ -26745,7 +26787,7 @@
             </a:endParaRPr>
           </a:p>
           <a:p>
-            <a:pPr marL="342720" indent="-335160">
+            <a:pPr marL="342720" indent="-334800">
               <a:lnSpc>
                 <a:spcPct val="93000"/>
               </a:lnSpc>
@@ -26778,7 +26820,7 @@
             </a:endParaRPr>
           </a:p>
           <a:p>
-            <a:pPr marL="342720" indent="-335160">
+            <a:pPr marL="342720" indent="-334800">
               <a:lnSpc>
                 <a:spcPct val="93000"/>
               </a:lnSpc>
@@ -26811,7 +26853,7 @@
             </a:endParaRPr>
           </a:p>
           <a:p>
-            <a:pPr marL="342720" indent="-335160">
+            <a:pPr marL="342720" indent="-334800">
               <a:lnSpc>
                 <a:spcPct val="93000"/>
               </a:lnSpc>
@@ -26844,7 +26886,7 @@
             </a:endParaRPr>
           </a:p>
           <a:p>
-            <a:pPr marL="342720" indent="-335160">
+            <a:pPr marL="342720" indent="-334800">
               <a:lnSpc>
                 <a:spcPct val="93000"/>
               </a:lnSpc>
@@ -26862,7 +26904,7 @@
             </a:endParaRPr>
           </a:p>
           <a:p>
-            <a:pPr marL="342720" indent="-335160">
+            <a:pPr marL="342720" indent="-334800">
               <a:lnSpc>
                 <a:spcPct val="93000"/>
               </a:lnSpc>
@@ -26910,7 +26952,7 @@
             </a:endParaRPr>
           </a:p>
           <a:p>
-            <a:pPr marL="342720" indent="-335160">
+            <a:pPr marL="342720" indent="-334800">
               <a:lnSpc>
                 <a:spcPct val="93000"/>
               </a:lnSpc>
@@ -26943,7 +26985,7 @@
             </a:endParaRPr>
           </a:p>
           <a:p>
-            <a:pPr marL="342720" indent="-335160">
+            <a:pPr marL="342720" indent="-334800">
               <a:lnSpc>
                 <a:spcPct val="93000"/>
               </a:lnSpc>
@@ -26976,7 +27018,7 @@
             </a:endParaRPr>
           </a:p>
           <a:p>
-            <a:pPr marL="342720" indent="-335160">
+            <a:pPr marL="342720" indent="-334800">
               <a:lnSpc>
                 <a:spcPct val="93000"/>
               </a:lnSpc>
@@ -27009,7 +27051,7 @@
             </a:endParaRPr>
           </a:p>
           <a:p>
-            <a:pPr marL="342720" indent="-335160">
+            <a:pPr marL="342720" indent="-334800">
               <a:lnSpc>
                 <a:spcPct val="93000"/>
               </a:lnSpc>
@@ -27042,7 +27084,7 @@
             </a:endParaRPr>
           </a:p>
           <a:p>
-            <a:pPr marL="342720" indent="-335160">
+            <a:pPr marL="342720" indent="-334800">
               <a:lnSpc>
                 <a:spcPct val="93000"/>
               </a:lnSpc>
@@ -27075,7 +27117,7 @@
             </a:endParaRPr>
           </a:p>
           <a:p>
-            <a:pPr marL="342720" indent="-335160">
+            <a:pPr marL="342720" indent="-334800">
               <a:lnSpc>
                 <a:spcPct val="93000"/>
               </a:lnSpc>
@@ -27108,7 +27150,7 @@
             </a:endParaRPr>
           </a:p>
           <a:p>
-            <a:pPr marL="342720" indent="-335160">
+            <a:pPr marL="342720" indent="-334800">
               <a:lnSpc>
                 <a:spcPct val="93000"/>
               </a:lnSpc>
@@ -27141,7 +27183,7 @@
             </a:endParaRPr>
           </a:p>
           <a:p>
-            <a:pPr marL="342720" indent="-335160">
+            <a:pPr marL="342720" indent="-334800">
               <a:lnSpc>
                 <a:spcPct val="93000"/>
               </a:lnSpc>
@@ -27174,7 +27216,7 @@
             </a:endParaRPr>
           </a:p>
           <a:p>
-            <a:pPr marL="342720" indent="-335160">
+            <a:pPr marL="342720" indent="-334800">
               <a:lnSpc>
                 <a:spcPct val="93000"/>
               </a:lnSpc>
@@ -27192,7 +27234,7 @@
             </a:endParaRPr>
           </a:p>
           <a:p>
-            <a:pPr marL="342720" indent="-335160">
+            <a:pPr marL="342720" indent="-334800">
               <a:lnSpc>
                 <a:spcPct val="93000"/>
               </a:lnSpc>
@@ -27210,7 +27252,7 @@
             </a:endParaRPr>
           </a:p>
           <a:p>
-            <a:pPr marL="342720" indent="-335160">
+            <a:pPr marL="342720" indent="-334800">
               <a:lnSpc>
                 <a:spcPct val="93000"/>
               </a:lnSpc>
@@ -27228,7 +27270,7 @@
             </a:endParaRPr>
           </a:p>
           <a:p>
-            <a:pPr marL="342720" indent="-335160">
+            <a:pPr marL="342720" indent="-334800">
               <a:lnSpc>
                 <a:spcPct val="93000"/>
               </a:lnSpc>
@@ -27246,7 +27288,7 @@
             </a:endParaRPr>
           </a:p>
           <a:p>
-            <a:pPr marL="342720" indent="-335160">
+            <a:pPr marL="342720" indent="-334800">
               <a:lnSpc>
                 <a:spcPct val="93000"/>
               </a:lnSpc>
@@ -27264,7 +27306,7 @@
             </a:endParaRPr>
           </a:p>
           <a:p>
-            <a:pPr marL="342720" indent="-335160">
+            <a:pPr marL="342720" indent="-334800">
               <a:lnSpc>
                 <a:spcPct val="93000"/>
               </a:lnSpc>
@@ -27282,7 +27324,7 @@
             </a:endParaRPr>
           </a:p>
           <a:p>
-            <a:pPr marL="342720" indent="-335160">
+            <a:pPr marL="342720" indent="-334800">
               <a:lnSpc>
                 <a:spcPct val="93000"/>
               </a:lnSpc>
@@ -27300,7 +27342,7 @@
             </a:endParaRPr>
           </a:p>
           <a:p>
-            <a:pPr marL="342720" indent="-335160">
+            <a:pPr marL="342720" indent="-334800">
               <a:lnSpc>
                 <a:spcPct val="93000"/>
               </a:lnSpc>
@@ -27318,7 +27360,7 @@
             </a:endParaRPr>
           </a:p>
           <a:p>
-            <a:pPr marL="342720" indent="-335160">
+            <a:pPr marL="342720" indent="-334800">
               <a:lnSpc>
                 <a:spcPct val="93000"/>
               </a:lnSpc>
@@ -27336,7 +27378,7 @@
             </a:endParaRPr>
           </a:p>
           <a:p>
-            <a:pPr marL="342720" indent="-335160">
+            <a:pPr marL="342720" indent="-334800">
               <a:lnSpc>
                 <a:spcPct val="93000"/>
               </a:lnSpc>
@@ -27354,7 +27396,7 @@
             </a:endParaRPr>
           </a:p>
           <a:p>
-            <a:pPr marL="342720" indent="-335160">
+            <a:pPr marL="342720" indent="-334800">
               <a:lnSpc>
                 <a:spcPct val="93000"/>
               </a:lnSpc>
@@ -27431,14 +27473,14 @@
       </p:grpSpPr>
       <p:sp>
         <p:nvSpPr>
-          <p:cNvPr id="192" name="CustomShape 1"/>
+          <p:cNvPr id="193" name="CustomShape 1"/>
           <p:cNvSpPr/>
           <p:nvPr/>
         </p:nvSpPr>
         <p:spPr>
           <a:xfrm>
             <a:off x="456840" y="1188720"/>
-            <a:ext cx="9069480" cy="6216840"/>
+            <a:ext cx="9069120" cy="6216480"/>
           </a:xfrm>
           <a:prstGeom prst="rect">
             <a:avLst/>
@@ -27523,7 +27565,7 @@
             </a:endParaRPr>
           </a:p>
           <a:p>
-            <a:pPr marL="215640" indent="-208080">
+            <a:pPr marL="215640" indent="-207720">
               <a:lnSpc>
                 <a:spcPct val="98000"/>
               </a:lnSpc>
@@ -27556,7 +27598,7 @@
             </a:endParaRPr>
           </a:p>
           <a:p>
-            <a:pPr marL="215640" indent="-208080">
+            <a:pPr marL="215640" indent="-207720">
               <a:lnSpc>
                 <a:spcPct val="98000"/>
               </a:lnSpc>
@@ -27589,7 +27631,7 @@
             </a:endParaRPr>
           </a:p>
           <a:p>
-            <a:pPr marL="215640" indent="-208080">
+            <a:pPr marL="215640" indent="-207720">
               <a:lnSpc>
                 <a:spcPct val="98000"/>
               </a:lnSpc>
@@ -27625,14 +27667,14 @@
       </p:sp>
       <p:sp>
         <p:nvSpPr>
-          <p:cNvPr id="193" name="CustomShape 2"/>
+          <p:cNvPr id="194" name="CustomShape 2"/>
           <p:cNvSpPr/>
           <p:nvPr/>
         </p:nvSpPr>
         <p:spPr>
           <a:xfrm>
             <a:off x="438120" y="731880"/>
-            <a:ext cx="9069480" cy="6216840"/>
+            <a:ext cx="9069120" cy="6216480"/>
           </a:xfrm>
           <a:custGeom>
             <a:avLst/>
@@ -27674,7 +27716,7 @@
         <p:txBody>
           <a:bodyPr lIns="0" rIns="0" tIns="7200" bIns="0"/>
           <a:p>
-            <a:pPr marL="342720" indent="-335160">
+            <a:pPr marL="342720" indent="-334800">
               <a:lnSpc>
                 <a:spcPct val="93000"/>
               </a:lnSpc>
@@ -27707,7 +27749,7 @@
             </a:endParaRPr>
           </a:p>
           <a:p>
-            <a:pPr marL="342720" indent="-335160">
+            <a:pPr marL="342720" indent="-334800">
               <a:lnSpc>
                 <a:spcPct val="93000"/>
               </a:lnSpc>
@@ -27740,7 +27782,7 @@
             </a:endParaRPr>
           </a:p>
           <a:p>
-            <a:pPr marL="342720" indent="-335160">
+            <a:pPr marL="342720" indent="-334800">
               <a:lnSpc>
                 <a:spcPct val="93000"/>
               </a:lnSpc>
@@ -27773,7 +27815,7 @@
             </a:endParaRPr>
           </a:p>
           <a:p>
-            <a:pPr marL="342720" indent="-335160">
+            <a:pPr marL="342720" indent="-334800">
               <a:lnSpc>
                 <a:spcPct val="93000"/>
               </a:lnSpc>
@@ -27791,7 +27833,7 @@
             </a:endParaRPr>
           </a:p>
           <a:p>
-            <a:pPr marL="342720" indent="-335160">
+            <a:pPr marL="342720" indent="-334800">
               <a:lnSpc>
                 <a:spcPct val="93000"/>
               </a:lnSpc>
@@ -27824,7 +27866,7 @@
             </a:endParaRPr>
           </a:p>
           <a:p>
-            <a:pPr marL="342720" indent="-335160">
+            <a:pPr marL="342720" indent="-334800">
               <a:lnSpc>
                 <a:spcPct val="93000"/>
               </a:lnSpc>
@@ -27857,7 +27899,7 @@
             </a:endParaRPr>
           </a:p>
           <a:p>
-            <a:pPr marL="342720" indent="-335160">
+            <a:pPr marL="342720" indent="-334800">
               <a:lnSpc>
                 <a:spcPct val="93000"/>
               </a:lnSpc>
@@ -27890,7 +27932,7 @@
             </a:endParaRPr>
           </a:p>
           <a:p>
-            <a:pPr marL="342720" indent="-335160">
+            <a:pPr marL="342720" indent="-334800">
               <a:lnSpc>
                 <a:spcPct val="93000"/>
               </a:lnSpc>
@@ -27908,7 +27950,7 @@
             </a:endParaRPr>
           </a:p>
           <a:p>
-            <a:pPr marL="342720" indent="-335160">
+            <a:pPr marL="342720" indent="-334800">
               <a:lnSpc>
                 <a:spcPct val="93000"/>
               </a:lnSpc>
@@ -28001,7 +28043,7 @@
             </a:endParaRPr>
           </a:p>
           <a:p>
-            <a:pPr marL="342720" indent="-335160">
+            <a:pPr marL="342720" indent="-334800">
               <a:lnSpc>
                 <a:spcPct val="93000"/>
               </a:lnSpc>
@@ -28019,7 +28061,7 @@
             </a:endParaRPr>
           </a:p>
           <a:p>
-            <a:pPr marL="342720" indent="-335160">
+            <a:pPr marL="342720" indent="-334800">
               <a:lnSpc>
                 <a:spcPct val="93000"/>
               </a:lnSpc>
@@ -28052,7 +28094,7 @@
             </a:endParaRPr>
           </a:p>
           <a:p>
-            <a:pPr marL="342720" indent="-335160">
+            <a:pPr marL="342720" indent="-334800">
               <a:lnSpc>
                 <a:spcPct val="93000"/>
               </a:lnSpc>
@@ -28085,7 +28127,7 @@
             </a:endParaRPr>
           </a:p>
           <a:p>
-            <a:pPr marL="342720" indent="-335160">
+            <a:pPr marL="342720" indent="-334800">
               <a:lnSpc>
                 <a:spcPct val="93000"/>
               </a:lnSpc>
@@ -28103,7 +28145,7 @@
             </a:endParaRPr>
           </a:p>
           <a:p>
-            <a:pPr marL="342720" indent="-335160">
+            <a:pPr marL="342720" indent="-334800">
               <a:lnSpc>
                 <a:spcPct val="93000"/>
               </a:lnSpc>
@@ -28166,7 +28208,7 @@
             </a:endParaRPr>
           </a:p>
           <a:p>
-            <a:pPr marL="342720" indent="-335160">
+            <a:pPr marL="342720" indent="-334800">
               <a:lnSpc>
                 <a:spcPct val="93000"/>
               </a:lnSpc>
@@ -28229,7 +28271,7 @@
             </a:endParaRPr>
           </a:p>
           <a:p>
-            <a:pPr marL="342720" indent="-335160">
+            <a:pPr marL="342720" indent="-334800">
               <a:lnSpc>
                 <a:spcPct val="93000"/>
               </a:lnSpc>
@@ -28247,7 +28289,7 @@
             </a:endParaRPr>
           </a:p>
           <a:p>
-            <a:pPr marL="342720" indent="-335160">
+            <a:pPr marL="342720" indent="-334800">
               <a:lnSpc>
                 <a:spcPct val="93000"/>
               </a:lnSpc>
@@ -28280,7 +28322,7 @@
             </a:endParaRPr>
           </a:p>
           <a:p>
-            <a:pPr marL="342720" indent="-335160">
+            <a:pPr marL="342720" indent="-334800">
               <a:lnSpc>
                 <a:spcPct val="93000"/>
               </a:lnSpc>
@@ -28313,7 +28355,7 @@
             </a:endParaRPr>
           </a:p>
           <a:p>
-            <a:pPr marL="342720" indent="-335160">
+            <a:pPr marL="342720" indent="-334800">
               <a:lnSpc>
                 <a:spcPct val="93000"/>
               </a:lnSpc>
@@ -28331,7 +28373,7 @@
             </a:endParaRPr>
           </a:p>
           <a:p>
-            <a:pPr marL="342720" indent="-335160">
+            <a:pPr marL="342720" indent="-334800">
               <a:lnSpc>
                 <a:spcPct val="93000"/>
               </a:lnSpc>
@@ -28430,7 +28472,7 @@
         <p:spPr>
           <a:xfrm>
             <a:off x="502920" y="549360"/>
-            <a:ext cx="9069480" cy="5942160"/>
+            <a:ext cx="9069120" cy="5941800"/>
           </a:xfrm>
           <a:prstGeom prst="rect">
             <a:avLst/>
@@ -28772,14 +28814,14 @@
       </p:grpSpPr>
       <p:sp>
         <p:nvSpPr>
-          <p:cNvPr id="194" name="CustomShape 1"/>
+          <p:cNvPr id="195" name="CustomShape 1"/>
           <p:cNvSpPr/>
           <p:nvPr/>
         </p:nvSpPr>
         <p:spPr>
           <a:xfrm>
             <a:off x="456840" y="1188720"/>
-            <a:ext cx="9069480" cy="6216840"/>
+            <a:ext cx="9069120" cy="6216480"/>
           </a:xfrm>
           <a:prstGeom prst="rect">
             <a:avLst/>
@@ -28864,7 +28906,7 @@
             </a:endParaRPr>
           </a:p>
           <a:p>
-            <a:pPr marL="215640" indent="-208080">
+            <a:pPr marL="215640" indent="-207720">
               <a:lnSpc>
                 <a:spcPct val="98000"/>
               </a:lnSpc>
@@ -28897,7 +28939,7 @@
             </a:endParaRPr>
           </a:p>
           <a:p>
-            <a:pPr marL="215640" indent="-208080">
+            <a:pPr marL="215640" indent="-207720">
               <a:lnSpc>
                 <a:spcPct val="98000"/>
               </a:lnSpc>
@@ -28930,7 +28972,7 @@
             </a:endParaRPr>
           </a:p>
           <a:p>
-            <a:pPr marL="215640" indent="-208080">
+            <a:pPr marL="215640" indent="-207720">
               <a:lnSpc>
                 <a:spcPct val="98000"/>
               </a:lnSpc>
@@ -28966,14 +29008,14 @@
       </p:sp>
       <p:sp>
         <p:nvSpPr>
-          <p:cNvPr id="195" name="CustomShape 2"/>
+          <p:cNvPr id="196" name="CustomShape 2"/>
           <p:cNvSpPr/>
           <p:nvPr/>
         </p:nvSpPr>
         <p:spPr>
           <a:xfrm>
             <a:off x="438120" y="731880"/>
-            <a:ext cx="9069480" cy="6216840"/>
+            <a:ext cx="9069120" cy="6216480"/>
           </a:xfrm>
           <a:custGeom>
             <a:avLst/>
@@ -29015,7 +29057,7 @@
         <p:txBody>
           <a:bodyPr lIns="0" rIns="0" tIns="7200" bIns="0"/>
           <a:p>
-            <a:pPr marL="342720" indent="-335160">
+            <a:pPr marL="342720" indent="-334800">
               <a:lnSpc>
                 <a:spcPct val="93000"/>
               </a:lnSpc>
@@ -29078,7 +29120,7 @@
             </a:endParaRPr>
           </a:p>
           <a:p>
-            <a:pPr marL="342720" indent="-335160">
+            <a:pPr marL="342720" indent="-334800">
               <a:lnSpc>
                 <a:spcPct val="93000"/>
               </a:lnSpc>
@@ -29128,6 +29170,447 @@
               </a:rPr>
               <a:t> she will die. (Choice)</a:t>
             </a:r>
+            <a:endParaRPr b="0" lang="en-US" sz="1800" spc="-1" strike="noStrike">
+              <a:solidFill>
+                <a:srgbClr val="000000"/>
+              </a:solidFill>
+              <a:uFill>
+                <a:solidFill>
+                  <a:srgbClr val="ffffff"/>
+                </a:solidFill>
+              </a:uFill>
+              <a:latin typeface="Arial"/>
+            </a:endParaRPr>
+          </a:p>
+          <a:p>
+            <a:pPr marL="342720" indent="-334800">
+              <a:lnSpc>
+                <a:spcPct val="93000"/>
+              </a:lnSpc>
+            </a:pPr>
+            <a:endParaRPr b="0" lang="en-US" sz="1800" spc="-1" strike="noStrike">
+              <a:solidFill>
+                <a:srgbClr val="000000"/>
+              </a:solidFill>
+              <a:uFill>
+                <a:solidFill>
+                  <a:srgbClr val="ffffff"/>
+                </a:solidFill>
+              </a:uFill>
+              <a:latin typeface="Arial"/>
+            </a:endParaRPr>
+          </a:p>
+          <a:p>
+            <a:pPr marL="342720" indent="-334800">
+              <a:lnSpc>
+                <a:spcPct val="93000"/>
+              </a:lnSpc>
+            </a:pPr>
+            <a:r>
+              <a:rPr b="0" lang="en-US" sz="2200" spc="-1" strike="noStrike">
+                <a:solidFill>
+                  <a:srgbClr val="000000"/>
+                </a:solidFill>
+                <a:uFill>
+                  <a:solidFill>
+                    <a:srgbClr val="ffffff"/>
+                  </a:solidFill>
+                </a:uFill>
+                <a:latin typeface="Georgia"/>
+                <a:ea typeface="DejaVu Sans"/>
+              </a:rPr>
+              <a:t>He finished first </a:t>
+            </a:r>
+            <a:r>
+              <a:rPr b="1" lang="en-US" sz="2200" spc="-1" strike="noStrike">
+                <a:solidFill>
+                  <a:srgbClr val="000000"/>
+                </a:solidFill>
+                <a:uFill>
+                  <a:solidFill>
+                    <a:srgbClr val="ffffff"/>
+                  </a:solidFill>
+                </a:uFill>
+                <a:latin typeface="Georgia"/>
+                <a:ea typeface="DejaVu Sans"/>
+              </a:rPr>
+              <a:t>though</a:t>
+            </a:r>
+            <a:r>
+              <a:rPr b="0" lang="en-US" sz="2200" spc="-1" strike="noStrike">
+                <a:solidFill>
+                  <a:srgbClr val="000000"/>
+                </a:solidFill>
+                <a:uFill>
+                  <a:solidFill>
+                    <a:srgbClr val="ffffff"/>
+                  </a:solidFill>
+                </a:uFill>
+                <a:latin typeface="Georgia"/>
+                <a:ea typeface="DejaVu Sans"/>
+              </a:rPr>
+              <a:t>(</a:t>
+            </a:r>
+            <a:r>
+              <a:rPr b="0" lang="en-US" sz="2200" spc="-1" strike="noStrike">
+                <a:solidFill>
+                  <a:srgbClr val="000000"/>
+                </a:solidFill>
+                <a:uFill>
+                  <a:solidFill>
+                    <a:srgbClr val="ffffff"/>
+                  </a:solidFill>
+                </a:uFill>
+                <a:latin typeface="Georgia"/>
+                <a:ea typeface="DejaVu Sans"/>
+              </a:rPr>
+              <a:t>যদিও</a:t>
+            </a:r>
+            <a:r>
+              <a:rPr b="0" lang="en-US" sz="2200" spc="-1" strike="noStrike">
+                <a:solidFill>
+                  <a:srgbClr val="000000"/>
+                </a:solidFill>
+                <a:uFill>
+                  <a:solidFill>
+                    <a:srgbClr val="ffffff"/>
+                  </a:solidFill>
+                </a:uFill>
+                <a:latin typeface="Georgia"/>
+                <a:ea typeface="DejaVu Sans"/>
+              </a:rPr>
+              <a:t>) he began late.</a:t>
+            </a:r>
+            <a:endParaRPr b="0" lang="en-US" sz="1800" spc="-1" strike="noStrike">
+              <a:solidFill>
+                <a:srgbClr val="000000"/>
+              </a:solidFill>
+              <a:uFill>
+                <a:solidFill>
+                  <a:srgbClr val="ffffff"/>
+                </a:solidFill>
+              </a:uFill>
+              <a:latin typeface="Arial"/>
+            </a:endParaRPr>
+          </a:p>
+          <a:p>
+            <a:pPr marL="342720" indent="-334800">
+              <a:lnSpc>
+                <a:spcPct val="93000"/>
+              </a:lnSpc>
+            </a:pPr>
+            <a:endParaRPr b="0" lang="en-US" sz="1800" spc="-1" strike="noStrike">
+              <a:solidFill>
+                <a:srgbClr val="000000"/>
+              </a:solidFill>
+              <a:uFill>
+                <a:solidFill>
+                  <a:srgbClr val="ffffff"/>
+                </a:solidFill>
+              </a:uFill>
+              <a:latin typeface="Arial"/>
+            </a:endParaRPr>
+          </a:p>
+          <a:p>
+            <a:pPr marL="342720" indent="-334800">
+              <a:lnSpc>
+                <a:spcPct val="93000"/>
+              </a:lnSpc>
+            </a:pPr>
+            <a:r>
+              <a:rPr b="1" lang="en-US" sz="2200" spc="-1" strike="noStrike">
+                <a:solidFill>
+                  <a:srgbClr val="000000"/>
+                </a:solidFill>
+                <a:uFill>
+                  <a:solidFill>
+                    <a:srgbClr val="ffffff"/>
+                  </a:solidFill>
+                </a:uFill>
+                <a:latin typeface="Georgia"/>
+                <a:ea typeface="DejaVu Sans"/>
+              </a:rPr>
+              <a:t>Since</a:t>
+            </a:r>
+            <a:r>
+              <a:rPr b="0" lang="en-US" sz="2200" spc="-1" strike="noStrike">
+                <a:solidFill>
+                  <a:srgbClr val="000000"/>
+                </a:solidFill>
+                <a:uFill>
+                  <a:solidFill>
+                    <a:srgbClr val="ffffff"/>
+                  </a:solidFill>
+                </a:uFill>
+                <a:latin typeface="Georgia"/>
+                <a:ea typeface="DejaVu Sans"/>
+              </a:rPr>
+              <a:t> you say so, I must believe it.</a:t>
+            </a:r>
+            <a:endParaRPr b="0" lang="en-US" sz="1800" spc="-1" strike="noStrike">
+              <a:solidFill>
+                <a:srgbClr val="000000"/>
+              </a:solidFill>
+              <a:uFill>
+                <a:solidFill>
+                  <a:srgbClr val="ffffff"/>
+                </a:solidFill>
+              </a:uFill>
+              <a:latin typeface="Arial"/>
+            </a:endParaRPr>
+          </a:p>
+          <a:p>
+            <a:pPr marL="342720" indent="-334800">
+              <a:lnSpc>
+                <a:spcPct val="93000"/>
+              </a:lnSpc>
+            </a:pPr>
+            <a:endParaRPr b="0" lang="en-US" sz="1800" spc="-1" strike="noStrike">
+              <a:solidFill>
+                <a:srgbClr val="000000"/>
+              </a:solidFill>
+              <a:uFill>
+                <a:solidFill>
+                  <a:srgbClr val="ffffff"/>
+                </a:solidFill>
+              </a:uFill>
+              <a:latin typeface="Arial"/>
+            </a:endParaRPr>
+          </a:p>
+          <a:p>
+            <a:pPr marL="342720" indent="-334800">
+              <a:lnSpc>
+                <a:spcPct val="93000"/>
+              </a:lnSpc>
+            </a:pPr>
+            <a:r>
+              <a:rPr b="1" lang="en-US" sz="2200" spc="-1" strike="noStrike">
+                <a:solidFill>
+                  <a:srgbClr val="000000"/>
+                </a:solidFill>
+                <a:uFill>
+                  <a:solidFill>
+                    <a:srgbClr val="ffffff"/>
+                  </a:solidFill>
+                </a:uFill>
+                <a:latin typeface="Georgia"/>
+                <a:ea typeface="DejaVu Sans"/>
+              </a:rPr>
+              <a:t>As</a:t>
+            </a:r>
+            <a:r>
+              <a:rPr b="0" lang="en-US" sz="2200" spc="-1" strike="noStrike">
+                <a:solidFill>
+                  <a:srgbClr val="000000"/>
+                </a:solidFill>
+                <a:uFill>
+                  <a:solidFill>
+                    <a:srgbClr val="ffffff"/>
+                  </a:solidFill>
+                </a:uFill>
+                <a:latin typeface="Georgia"/>
+                <a:ea typeface="DejaVu Sans"/>
+              </a:rPr>
+              <a:t> he is is young and energetic, he can do this task easily.</a:t>
+            </a:r>
+            <a:endParaRPr b="0" lang="en-US" sz="1800" spc="-1" strike="noStrike">
+              <a:solidFill>
+                <a:srgbClr val="000000"/>
+              </a:solidFill>
+              <a:uFill>
+                <a:solidFill>
+                  <a:srgbClr val="ffffff"/>
+                </a:solidFill>
+              </a:uFill>
+              <a:latin typeface="Arial"/>
+            </a:endParaRPr>
+          </a:p>
+          <a:p>
+            <a:pPr marL="342720" indent="-334800">
+              <a:lnSpc>
+                <a:spcPct val="93000"/>
+              </a:lnSpc>
+            </a:pPr>
+            <a:endParaRPr b="0" lang="en-US" sz="1800" spc="-1" strike="noStrike">
+              <a:solidFill>
+                <a:srgbClr val="000000"/>
+              </a:solidFill>
+              <a:uFill>
+                <a:solidFill>
+                  <a:srgbClr val="ffffff"/>
+                </a:solidFill>
+              </a:uFill>
+              <a:latin typeface="Arial"/>
+            </a:endParaRPr>
+          </a:p>
+          <a:p>
+            <a:pPr marL="342720" indent="-334800">
+              <a:lnSpc>
+                <a:spcPct val="93000"/>
+              </a:lnSpc>
+            </a:pPr>
+            <a:r>
+              <a:rPr b="0" lang="en-US" sz="2200" spc="-1" strike="noStrike">
+                <a:solidFill>
+                  <a:srgbClr val="000000"/>
+                </a:solidFill>
+                <a:uFill>
+                  <a:solidFill>
+                    <a:srgbClr val="ffffff"/>
+                  </a:solidFill>
+                </a:uFill>
+                <a:latin typeface="Georgia"/>
+                <a:ea typeface="DejaVu Sans"/>
+              </a:rPr>
+              <a:t>He is energetic, enthusiastic </a:t>
+            </a:r>
+            <a:r>
+              <a:rPr b="1" lang="en-US" sz="2200" spc="-1" strike="noStrike">
+                <a:solidFill>
+                  <a:srgbClr val="000000"/>
+                </a:solidFill>
+                <a:uFill>
+                  <a:solidFill>
+                    <a:srgbClr val="ffffff"/>
+                  </a:solidFill>
+                </a:uFill>
+                <a:latin typeface="Georgia"/>
+                <a:ea typeface="DejaVu Sans"/>
+              </a:rPr>
+              <a:t>and</a:t>
+            </a:r>
+            <a:r>
+              <a:rPr b="0" lang="en-US" sz="2200" spc="-1" strike="noStrike">
+                <a:solidFill>
+                  <a:srgbClr val="000000"/>
+                </a:solidFill>
+                <a:uFill>
+                  <a:solidFill>
+                    <a:srgbClr val="ffffff"/>
+                  </a:solidFill>
+                </a:uFill>
+                <a:latin typeface="Georgia"/>
+                <a:ea typeface="DejaVu Sans"/>
+              </a:rPr>
+              <a:t> adventurous.</a:t>
+            </a:r>
+            <a:endParaRPr b="0" lang="en-US" sz="1800" spc="-1" strike="noStrike">
+              <a:solidFill>
+                <a:srgbClr val="000000"/>
+              </a:solidFill>
+              <a:uFill>
+                <a:solidFill>
+                  <a:srgbClr val="ffffff"/>
+                </a:solidFill>
+              </a:uFill>
+              <a:latin typeface="Arial"/>
+            </a:endParaRPr>
+          </a:p>
+          <a:p>
+            <a:pPr marL="342720" indent="-334800">
+              <a:lnSpc>
+                <a:spcPct val="93000"/>
+              </a:lnSpc>
+            </a:pPr>
+            <a:endParaRPr b="0" lang="en-US" sz="1800" spc="-1" strike="noStrike">
+              <a:solidFill>
+                <a:srgbClr val="000000"/>
+              </a:solidFill>
+              <a:uFill>
+                <a:solidFill>
+                  <a:srgbClr val="ffffff"/>
+                </a:solidFill>
+              </a:uFill>
+              <a:latin typeface="Arial"/>
+            </a:endParaRPr>
+          </a:p>
+          <a:p>
+            <a:pPr marL="342720" indent="-334800">
+              <a:lnSpc>
+                <a:spcPct val="93000"/>
+              </a:lnSpc>
+            </a:pPr>
+            <a:r>
+              <a:rPr b="0" lang="en-US" sz="2200" spc="-1" strike="noStrike">
+                <a:solidFill>
+                  <a:srgbClr val="000000"/>
+                </a:solidFill>
+                <a:uFill>
+                  <a:solidFill>
+                    <a:srgbClr val="ffffff"/>
+                  </a:solidFill>
+                </a:uFill>
+                <a:latin typeface="Georgia"/>
+                <a:ea typeface="DejaVu Sans"/>
+              </a:rPr>
+              <a:t>He is generous, kind </a:t>
+            </a:r>
+            <a:r>
+              <a:rPr b="1" lang="en-US" sz="2200" spc="-1" strike="noStrike">
+                <a:solidFill>
+                  <a:srgbClr val="000000"/>
+                </a:solidFill>
+                <a:uFill>
+                  <a:solidFill>
+                    <a:srgbClr val="ffffff"/>
+                  </a:solidFill>
+                </a:uFill>
+                <a:latin typeface="Georgia"/>
+                <a:ea typeface="DejaVu Sans"/>
+              </a:rPr>
+              <a:t>and</a:t>
+            </a:r>
+            <a:r>
+              <a:rPr b="0" lang="en-US" sz="2200" spc="-1" strike="noStrike">
+                <a:solidFill>
+                  <a:srgbClr val="000000"/>
+                </a:solidFill>
+                <a:uFill>
+                  <a:solidFill>
+                    <a:srgbClr val="ffffff"/>
+                  </a:solidFill>
+                </a:uFill>
+                <a:latin typeface="Georgia"/>
+                <a:ea typeface="DejaVu Sans"/>
+              </a:rPr>
+              <a:t> altruist.</a:t>
+            </a:r>
+            <a:endParaRPr b="0" lang="en-US" sz="1800" spc="-1" strike="noStrike">
+              <a:solidFill>
+                <a:srgbClr val="000000"/>
+              </a:solidFill>
+              <a:uFill>
+                <a:solidFill>
+                  <a:srgbClr val="ffffff"/>
+                </a:solidFill>
+              </a:uFill>
+              <a:latin typeface="Arial"/>
+            </a:endParaRPr>
+          </a:p>
+          <a:p>
+            <a:pPr marL="342720" indent="-334800">
+              <a:lnSpc>
+                <a:spcPct val="93000"/>
+              </a:lnSpc>
+            </a:pPr>
+            <a:endParaRPr b="0" lang="en-US" sz="1800" spc="-1" strike="noStrike">
+              <a:solidFill>
+                <a:srgbClr val="000000"/>
+              </a:solidFill>
+              <a:uFill>
+                <a:solidFill>
+                  <a:srgbClr val="ffffff"/>
+                </a:solidFill>
+              </a:uFill>
+              <a:latin typeface="Arial"/>
+            </a:endParaRPr>
+          </a:p>
+          <a:p>
+            <a:pPr marL="342720" indent="-334800">
+              <a:lnSpc>
+                <a:spcPct val="93000"/>
+              </a:lnSpc>
+            </a:pPr>
             <a:endParaRPr b="0" lang="en-US" sz="1800" spc="-1" strike="noStrike">
               <a:solidFill>
                 <a:srgbClr val="000000"/>
@@ -29200,14 +29683,14 @@
       </p:grpSpPr>
       <p:sp>
         <p:nvSpPr>
-          <p:cNvPr id="196" name="CustomShape 1"/>
+          <p:cNvPr id="197" name="CustomShape 1"/>
           <p:cNvSpPr/>
           <p:nvPr/>
         </p:nvSpPr>
         <p:spPr>
           <a:xfrm>
             <a:off x="456840" y="1188720"/>
-            <a:ext cx="9069480" cy="6216840"/>
+            <a:ext cx="9069120" cy="6216480"/>
           </a:xfrm>
           <a:prstGeom prst="rect">
             <a:avLst/>
@@ -29292,7 +29775,7 @@
             </a:endParaRPr>
           </a:p>
           <a:p>
-            <a:pPr marL="215640" indent="-208080">
+            <a:pPr marL="215640" indent="-207720">
               <a:lnSpc>
                 <a:spcPct val="98000"/>
               </a:lnSpc>
@@ -29325,7 +29808,7 @@
             </a:endParaRPr>
           </a:p>
           <a:p>
-            <a:pPr marL="215640" indent="-208080">
+            <a:pPr marL="215640" indent="-207720">
               <a:lnSpc>
                 <a:spcPct val="98000"/>
               </a:lnSpc>
@@ -29358,7 +29841,7 @@
             </a:endParaRPr>
           </a:p>
           <a:p>
-            <a:pPr marL="215640" indent="-208080">
+            <a:pPr marL="215640" indent="-207720">
               <a:lnSpc>
                 <a:spcPct val="98000"/>
               </a:lnSpc>
@@ -29394,14 +29877,14 @@
       </p:sp>
       <p:sp>
         <p:nvSpPr>
-          <p:cNvPr id="197" name="CustomShape 2"/>
+          <p:cNvPr id="198" name="CustomShape 2"/>
           <p:cNvSpPr/>
           <p:nvPr/>
         </p:nvSpPr>
         <p:spPr>
           <a:xfrm>
             <a:off x="438120" y="731880"/>
-            <a:ext cx="9069480" cy="6216840"/>
+            <a:ext cx="9069120" cy="6216480"/>
           </a:xfrm>
           <a:custGeom>
             <a:avLst/>
@@ -29443,14 +29926,14 @@
       </p:sp>
       <p:sp>
         <p:nvSpPr>
-          <p:cNvPr id="198" name="CustomShape 3"/>
+          <p:cNvPr id="199" name="CustomShape 3"/>
           <p:cNvSpPr/>
           <p:nvPr/>
         </p:nvSpPr>
         <p:spPr>
           <a:xfrm>
             <a:off x="548640" y="640080"/>
-            <a:ext cx="9158760" cy="6782400"/>
+            <a:ext cx="9158400" cy="6782040"/>
           </a:xfrm>
           <a:prstGeom prst="rect">
             <a:avLst/>
@@ -29915,14 +30398,14 @@
       </p:grpSpPr>
       <p:sp>
         <p:nvSpPr>
-          <p:cNvPr id="199" name="CustomShape 1"/>
+          <p:cNvPr id="200" name="CustomShape 1"/>
           <p:cNvSpPr/>
           <p:nvPr/>
         </p:nvSpPr>
         <p:spPr>
           <a:xfrm>
             <a:off x="456840" y="1188720"/>
-            <a:ext cx="9069480" cy="6216840"/>
+            <a:ext cx="9069120" cy="6216480"/>
           </a:xfrm>
           <a:prstGeom prst="rect">
             <a:avLst/>
@@ -30007,7 +30490,7 @@
             </a:endParaRPr>
           </a:p>
           <a:p>
-            <a:pPr marL="215640" indent="-208080">
+            <a:pPr marL="215640" indent="-207720">
               <a:lnSpc>
                 <a:spcPct val="98000"/>
               </a:lnSpc>
@@ -30040,7 +30523,7 @@
             </a:endParaRPr>
           </a:p>
           <a:p>
-            <a:pPr marL="215640" indent="-208080">
+            <a:pPr marL="215640" indent="-207720">
               <a:lnSpc>
                 <a:spcPct val="98000"/>
               </a:lnSpc>
@@ -30073,7 +30556,7 @@
             </a:endParaRPr>
           </a:p>
           <a:p>
-            <a:pPr marL="215640" indent="-208080">
+            <a:pPr marL="215640" indent="-207720">
               <a:lnSpc>
                 <a:spcPct val="98000"/>
               </a:lnSpc>
@@ -30109,14 +30592,14 @@
       </p:sp>
       <p:sp>
         <p:nvSpPr>
-          <p:cNvPr id="200" name="CustomShape 2"/>
+          <p:cNvPr id="201" name="CustomShape 2"/>
           <p:cNvSpPr/>
           <p:nvPr/>
         </p:nvSpPr>
         <p:spPr>
           <a:xfrm>
             <a:off x="438120" y="731880"/>
-            <a:ext cx="9069480" cy="6216840"/>
+            <a:ext cx="9069120" cy="6216480"/>
           </a:xfrm>
           <a:custGeom>
             <a:avLst/>
@@ -30757,14 +31240,14 @@
       </p:grpSpPr>
       <p:sp>
         <p:nvSpPr>
-          <p:cNvPr id="201" name="CustomShape 1"/>
+          <p:cNvPr id="202" name="CustomShape 1"/>
           <p:cNvSpPr/>
           <p:nvPr/>
         </p:nvSpPr>
         <p:spPr>
           <a:xfrm>
             <a:off x="456840" y="1188720"/>
-            <a:ext cx="9069480" cy="6216840"/>
+            <a:ext cx="9069120" cy="6216480"/>
           </a:xfrm>
           <a:prstGeom prst="rect">
             <a:avLst/>
@@ -30849,7 +31332,7 @@
             </a:endParaRPr>
           </a:p>
           <a:p>
-            <a:pPr marL="215640" indent="-208080">
+            <a:pPr marL="215640" indent="-207720">
               <a:lnSpc>
                 <a:spcPct val="98000"/>
               </a:lnSpc>
@@ -30882,7 +31365,7 @@
             </a:endParaRPr>
           </a:p>
           <a:p>
-            <a:pPr marL="215640" indent="-208080">
+            <a:pPr marL="215640" indent="-207720">
               <a:lnSpc>
                 <a:spcPct val="98000"/>
               </a:lnSpc>
@@ -30915,7 +31398,7 @@
             </a:endParaRPr>
           </a:p>
           <a:p>
-            <a:pPr marL="215640" indent="-208080">
+            <a:pPr marL="215640" indent="-207720">
               <a:lnSpc>
                 <a:spcPct val="98000"/>
               </a:lnSpc>
@@ -30951,14 +31434,14 @@
       </p:sp>
       <p:sp>
         <p:nvSpPr>
-          <p:cNvPr id="202" name="CustomShape 2"/>
+          <p:cNvPr id="203" name="CustomShape 2"/>
           <p:cNvSpPr/>
           <p:nvPr/>
         </p:nvSpPr>
         <p:spPr>
           <a:xfrm>
             <a:off x="438120" y="731880"/>
-            <a:ext cx="9069480" cy="6216840"/>
+            <a:ext cx="9069120" cy="6216480"/>
           </a:xfrm>
           <a:custGeom>
             <a:avLst/>
@@ -31383,14 +31866,14 @@
       </p:grpSpPr>
       <p:sp>
         <p:nvSpPr>
-          <p:cNvPr id="203" name="CustomShape 1"/>
+          <p:cNvPr id="204" name="CustomShape 1"/>
           <p:cNvSpPr/>
           <p:nvPr/>
         </p:nvSpPr>
         <p:spPr>
           <a:xfrm>
             <a:off x="456840" y="1188720"/>
-            <a:ext cx="9069480" cy="6216840"/>
+            <a:ext cx="9069120" cy="6216480"/>
           </a:xfrm>
           <a:prstGeom prst="rect">
             <a:avLst/>
@@ -31475,7 +31958,7 @@
             </a:endParaRPr>
           </a:p>
           <a:p>
-            <a:pPr marL="215640" indent="-208080">
+            <a:pPr marL="215640" indent="-207720">
               <a:lnSpc>
                 <a:spcPct val="98000"/>
               </a:lnSpc>
@@ -31508,7 +31991,7 @@
             </a:endParaRPr>
           </a:p>
           <a:p>
-            <a:pPr marL="215640" indent="-208080">
+            <a:pPr marL="215640" indent="-207720">
               <a:lnSpc>
                 <a:spcPct val="98000"/>
               </a:lnSpc>
@@ -31541,7 +32024,7 @@
             </a:endParaRPr>
           </a:p>
           <a:p>
-            <a:pPr marL="215640" indent="-208080">
+            <a:pPr marL="215640" indent="-207720">
               <a:lnSpc>
                 <a:spcPct val="98000"/>
               </a:lnSpc>
@@ -31577,14 +32060,14 @@
       </p:sp>
       <p:sp>
         <p:nvSpPr>
-          <p:cNvPr id="204" name="CustomShape 2"/>
+          <p:cNvPr id="205" name="CustomShape 2"/>
           <p:cNvSpPr/>
           <p:nvPr/>
         </p:nvSpPr>
         <p:spPr>
           <a:xfrm>
             <a:off x="438120" y="731880"/>
-            <a:ext cx="9069480" cy="6216840"/>
+            <a:ext cx="9069120" cy="6216480"/>
           </a:xfrm>
           <a:custGeom>
             <a:avLst/>
@@ -31718,14 +32201,14 @@
       </p:grpSpPr>
       <p:sp>
         <p:nvSpPr>
-          <p:cNvPr id="205" name="CustomShape 1"/>
+          <p:cNvPr id="206" name="CustomShape 1"/>
           <p:cNvSpPr/>
           <p:nvPr/>
         </p:nvSpPr>
         <p:spPr>
           <a:xfrm>
             <a:off x="456840" y="1188720"/>
-            <a:ext cx="9069480" cy="6216840"/>
+            <a:ext cx="9069120" cy="6216480"/>
           </a:xfrm>
           <a:prstGeom prst="rect">
             <a:avLst/>
@@ -31810,7 +32293,7 @@
             </a:endParaRPr>
           </a:p>
           <a:p>
-            <a:pPr marL="215640" indent="-208080">
+            <a:pPr marL="215640" indent="-207720">
               <a:lnSpc>
                 <a:spcPct val="98000"/>
               </a:lnSpc>
@@ -31843,7 +32326,7 @@
             </a:endParaRPr>
           </a:p>
           <a:p>
-            <a:pPr marL="215640" indent="-208080">
+            <a:pPr marL="215640" indent="-207720">
               <a:lnSpc>
                 <a:spcPct val="98000"/>
               </a:lnSpc>
@@ -31876,7 +32359,7 @@
             </a:endParaRPr>
           </a:p>
           <a:p>
-            <a:pPr marL="215640" indent="-208080">
+            <a:pPr marL="215640" indent="-207720">
               <a:lnSpc>
                 <a:spcPct val="98000"/>
               </a:lnSpc>
@@ -31912,14 +32395,14 @@
       </p:sp>
       <p:sp>
         <p:nvSpPr>
-          <p:cNvPr id="206" name="CustomShape 2"/>
+          <p:cNvPr id="207" name="CustomShape 2"/>
           <p:cNvSpPr/>
           <p:nvPr/>
         </p:nvSpPr>
         <p:spPr>
           <a:xfrm>
             <a:off x="438120" y="731880"/>
-            <a:ext cx="9069480" cy="6216840"/>
+            <a:ext cx="9069120" cy="6216480"/>
           </a:xfrm>
           <a:custGeom>
             <a:avLst/>
@@ -32030,7 +32513,7 @@
                 <a:latin typeface="Georgia"/>
                 <a:ea typeface="DejaVu Sans"/>
               </a:rPr>
-              <a:t>WOW !</a:t>
+              <a:t>Wow !</a:t>
             </a:r>
             <a:endParaRPr b="0" lang="en-US" sz="1800" spc="-1" strike="noStrike">
               <a:solidFill>
@@ -32063,7 +32546,7 @@
                 <a:latin typeface="Georgia"/>
                 <a:ea typeface="DejaVu Sans"/>
               </a:rPr>
-              <a:t>EWW !  Opposite of WOW !</a:t>
+              <a:t>Eww !  Opposite of WOW !</a:t>
             </a:r>
             <a:endParaRPr b="0" lang="en-US" sz="1800" spc="-1" strike="noStrike">
               <a:solidFill>
@@ -32114,7 +32597,7 @@
                 <a:latin typeface="Georgia"/>
                 <a:ea typeface="DejaVu Sans"/>
               </a:rPr>
-              <a:t>HURRAY! I won the racec.</a:t>
+              <a:t>Hurray! I won the racec.</a:t>
             </a:r>
             <a:endParaRPr b="0" lang="en-US" sz="1800" spc="-1" strike="noStrike">
               <a:solidFill>
@@ -32147,7 +32630,7 @@
                 <a:latin typeface="Georgia"/>
                 <a:ea typeface="DejaVu Sans"/>
               </a:rPr>
-              <a:t>ARGH! This car does not work.</a:t>
+              <a:t>Argh! This car does not work.</a:t>
             </a:r>
             <a:endParaRPr b="0" lang="en-US" sz="1800" spc="-1" strike="noStrike">
               <a:solidFill>
@@ -32180,7 +32663,7 @@
                 <a:latin typeface="Georgia"/>
                 <a:ea typeface="DejaVu Sans"/>
               </a:rPr>
-              <a:t>OOPS! I forgot to take the keys.</a:t>
+              <a:t>Oops! I forgot to take the keys.</a:t>
             </a:r>
             <a:endParaRPr b="0" lang="en-US" sz="1800" spc="-1" strike="noStrike">
               <a:solidFill>
@@ -32261,7 +32744,7 @@
         <p:spPr>
           <a:xfrm>
             <a:off x="502920" y="549360"/>
-            <a:ext cx="9069480" cy="5942160"/>
+            <a:ext cx="9069120" cy="5941800"/>
           </a:xfrm>
           <a:prstGeom prst="rect">
             <a:avLst/>
@@ -32817,7 +33300,7 @@
         <p:spPr>
           <a:xfrm>
             <a:off x="502920" y="549360"/>
-            <a:ext cx="9069480" cy="5942160"/>
+            <a:ext cx="9069120" cy="5941800"/>
           </a:xfrm>
           <a:prstGeom prst="rect">
             <a:avLst/>
@@ -33244,7 +33727,7 @@
         <p:spPr>
           <a:xfrm>
             <a:off x="502920" y="549360"/>
-            <a:ext cx="9069480" cy="5942160"/>
+            <a:ext cx="9069120" cy="5941800"/>
           </a:xfrm>
           <a:prstGeom prst="rect">
             <a:avLst/>
@@ -33686,7 +34169,7 @@
         <p:spPr>
           <a:xfrm>
             <a:off x="502920" y="301680"/>
-            <a:ext cx="9069480" cy="1260720"/>
+            <a:ext cx="9069120" cy="1260360"/>
           </a:xfrm>
           <a:prstGeom prst="rect">
             <a:avLst/>
@@ -33748,7 +34231,7 @@
         <p:spPr>
           <a:xfrm>
             <a:off x="502920" y="1767960"/>
-            <a:ext cx="9069480" cy="5635800"/>
+            <a:ext cx="9069120" cy="5635440"/>
           </a:xfrm>
           <a:prstGeom prst="rect">
             <a:avLst/>
@@ -33911,7 +34394,7 @@
             </a:endParaRPr>
           </a:p>
           <a:p>
-            <a:pPr marL="209520" indent="-208080">
+            <a:pPr marL="209520" indent="-207720">
               <a:lnSpc>
                 <a:spcPct val="98000"/>
               </a:lnSpc>
@@ -33980,7 +34463,7 @@
             </a:endParaRPr>
           </a:p>
           <a:p>
-            <a:pPr marL="209520" indent="-208080">
+            <a:pPr marL="209520" indent="-207720">
               <a:lnSpc>
                 <a:spcPct val="98000"/>
               </a:lnSpc>
@@ -34049,7 +34532,7 @@
             </a:endParaRPr>
           </a:p>
           <a:p>
-            <a:pPr marL="209520" indent="-208080">
+            <a:pPr marL="209520" indent="-207720">
               <a:lnSpc>
                 <a:spcPct val="98000"/>
               </a:lnSpc>
@@ -34118,7 +34601,7 @@
             </a:endParaRPr>
           </a:p>
           <a:p>
-            <a:pPr marL="209520" indent="-208080">
+            <a:pPr marL="209520" indent="-207720">
               <a:lnSpc>
                 <a:spcPct val="98000"/>
               </a:lnSpc>
@@ -34187,7 +34670,7 @@
             </a:endParaRPr>
           </a:p>
           <a:p>
-            <a:pPr marL="209520" indent="-208080">
+            <a:pPr marL="209520" indent="-207720">
               <a:lnSpc>
                 <a:spcPct val="98000"/>
               </a:lnSpc>
@@ -34256,7 +34739,7 @@
             </a:endParaRPr>
           </a:p>
           <a:p>
-            <a:pPr marL="209520" indent="-208080">
+            <a:pPr marL="209520" indent="-207720">
               <a:lnSpc>
                 <a:spcPct val="98000"/>
               </a:lnSpc>
@@ -34325,7 +34808,7 @@
             </a:endParaRPr>
           </a:p>
           <a:p>
-            <a:pPr marL="215640" indent="-208080">
+            <a:pPr marL="215640" indent="-207720">
               <a:lnSpc>
                 <a:spcPct val="98000"/>
               </a:lnSpc>
@@ -34358,7 +34841,7 @@
             </a:endParaRPr>
           </a:p>
           <a:p>
-            <a:pPr marL="215640" indent="-208080">
+            <a:pPr marL="215640" indent="-207720">
               <a:lnSpc>
                 <a:spcPct val="98000"/>
               </a:lnSpc>
@@ -34391,7 +34874,7 @@
             </a:endParaRPr>
           </a:p>
           <a:p>
-            <a:pPr marL="215640" indent="-208080">
+            <a:pPr marL="215640" indent="-207720">
               <a:lnSpc>
                 <a:spcPct val="98000"/>
               </a:lnSpc>
@@ -34424,7 +34907,7 @@
             </a:endParaRPr>
           </a:p>
           <a:p>
-            <a:pPr marL="215640" indent="-208080">
+            <a:pPr marL="215640" indent="-207720">
               <a:lnSpc>
                 <a:spcPct val="98000"/>
               </a:lnSpc>
@@ -34523,7 +35006,7 @@
         <p:spPr>
           <a:xfrm>
             <a:off x="502920" y="549360"/>
-            <a:ext cx="9069480" cy="5942160"/>
+            <a:ext cx="9069120" cy="5941800"/>
           </a:xfrm>
           <a:prstGeom prst="rect">
             <a:avLst/>

</xml_diff>